<commit_message>
Fix from video update/sync issues
</commit_message>
<xml_diff>
--- a/Documentation/ARINC429_AttackPaths.pptx
+++ b/Documentation/ARINC429_AttackPaths.pptx
@@ -6,6 +6,8 @@
   </p:sldMasterIdLst>
   <p:sldIdLst>
     <p:sldId id="257" r:id="rId2"/>
+    <p:sldId id="259" r:id="rId3"/>
+    <p:sldId id="258" r:id="rId4"/>
   </p:sldIdLst>
   <p:sldSz cx="12192000" cy="6858000"/>
   <p:notesSz cx="6858000" cy="9144000"/>
@@ -259,7 +261,7 @@
           <a:p>
             <a:fld id="{27483764-2814-4D42-A45C-259D96FE58DF}" type="datetimeFigureOut">
               <a:rPr lang="en-US" smtClean="0"/>
-              <a:t>5/29/2024</a:t>
+              <a:t>7/2/2024</a:t>
             </a:fld>
             <a:endParaRPr lang="en-US"/>
           </a:p>
@@ -457,7 +459,7 @@
           <a:p>
             <a:fld id="{27483764-2814-4D42-A45C-259D96FE58DF}" type="datetimeFigureOut">
               <a:rPr lang="en-US" smtClean="0"/>
-              <a:t>5/29/2024</a:t>
+              <a:t>7/2/2024</a:t>
             </a:fld>
             <a:endParaRPr lang="en-US"/>
           </a:p>
@@ -665,7 +667,7 @@
           <a:p>
             <a:fld id="{27483764-2814-4D42-A45C-259D96FE58DF}" type="datetimeFigureOut">
               <a:rPr lang="en-US" smtClean="0"/>
-              <a:t>5/29/2024</a:t>
+              <a:t>7/2/2024</a:t>
             </a:fld>
             <a:endParaRPr lang="en-US"/>
           </a:p>
@@ -863,7 +865,7 @@
           <a:p>
             <a:fld id="{27483764-2814-4D42-A45C-259D96FE58DF}" type="datetimeFigureOut">
               <a:rPr lang="en-US" smtClean="0"/>
-              <a:t>5/29/2024</a:t>
+              <a:t>7/2/2024</a:t>
             </a:fld>
             <a:endParaRPr lang="en-US"/>
           </a:p>
@@ -1138,7 +1140,7 @@
           <a:p>
             <a:fld id="{27483764-2814-4D42-A45C-259D96FE58DF}" type="datetimeFigureOut">
               <a:rPr lang="en-US" smtClean="0"/>
-              <a:t>5/29/2024</a:t>
+              <a:t>7/2/2024</a:t>
             </a:fld>
             <a:endParaRPr lang="en-US"/>
           </a:p>
@@ -1403,7 +1405,7 @@
           <a:p>
             <a:fld id="{27483764-2814-4D42-A45C-259D96FE58DF}" type="datetimeFigureOut">
               <a:rPr lang="en-US" smtClean="0"/>
-              <a:t>5/29/2024</a:t>
+              <a:t>7/2/2024</a:t>
             </a:fld>
             <a:endParaRPr lang="en-US"/>
           </a:p>
@@ -1815,7 +1817,7 @@
           <a:p>
             <a:fld id="{27483764-2814-4D42-A45C-259D96FE58DF}" type="datetimeFigureOut">
               <a:rPr lang="en-US" smtClean="0"/>
-              <a:t>5/29/2024</a:t>
+              <a:t>7/2/2024</a:t>
             </a:fld>
             <a:endParaRPr lang="en-US"/>
           </a:p>
@@ -1956,7 +1958,7 @@
           <a:p>
             <a:fld id="{27483764-2814-4D42-A45C-259D96FE58DF}" type="datetimeFigureOut">
               <a:rPr lang="en-US" smtClean="0"/>
-              <a:t>5/29/2024</a:t>
+              <a:t>7/2/2024</a:t>
             </a:fld>
             <a:endParaRPr lang="en-US"/>
           </a:p>
@@ -2069,7 +2071,7 @@
           <a:p>
             <a:fld id="{27483764-2814-4D42-A45C-259D96FE58DF}" type="datetimeFigureOut">
               <a:rPr lang="en-US" smtClean="0"/>
-              <a:t>5/29/2024</a:t>
+              <a:t>7/2/2024</a:t>
             </a:fld>
             <a:endParaRPr lang="en-US"/>
           </a:p>
@@ -2380,7 +2382,7 @@
           <a:p>
             <a:fld id="{27483764-2814-4D42-A45C-259D96FE58DF}" type="datetimeFigureOut">
               <a:rPr lang="en-US" smtClean="0"/>
-              <a:t>5/29/2024</a:t>
+              <a:t>7/2/2024</a:t>
             </a:fld>
             <a:endParaRPr lang="en-US"/>
           </a:p>
@@ -2668,7 +2670,7 @@
           <a:p>
             <a:fld id="{27483764-2814-4D42-A45C-259D96FE58DF}" type="datetimeFigureOut">
               <a:rPr lang="en-US" smtClean="0"/>
-              <a:t>5/29/2024</a:t>
+              <a:t>7/2/2024</a:t>
             </a:fld>
             <a:endParaRPr lang="en-US"/>
           </a:p>
@@ -2909,7 +2911,7 @@
           <a:p>
             <a:fld id="{27483764-2814-4D42-A45C-259D96FE58DF}" type="datetimeFigureOut">
               <a:rPr lang="en-US" smtClean="0"/>
-              <a:t>5/29/2024</a:t>
+              <a:t>7/2/2024</a:t>
             </a:fld>
             <a:endParaRPr lang="en-US"/>
           </a:p>
@@ -3328,10 +3330,478 @@
       </p:grpSpPr>
       <p:sp>
         <p:nvSpPr>
-          <p:cNvPr id="101" name="Rectangle: Rounded Corners 100">
-            <a:extLst>
-              <a:ext uri="{FF2B5EF4-FFF2-40B4-BE49-F238E27FC236}">
-                <a16:creationId xmlns:a16="http://schemas.microsoft.com/office/drawing/2014/main" id="{2BE64417-5A91-C76A-5697-0A921F6847DA}"/>
+          <p:cNvPr id="2" name="Title 1">
+            <a:extLst>
+              <a:ext uri="{FF2B5EF4-FFF2-40B4-BE49-F238E27FC236}">
+                <a16:creationId xmlns:a16="http://schemas.microsoft.com/office/drawing/2014/main" id="{F836681C-4B70-DB2A-A328-C2C133370E87}"/>
+              </a:ext>
+            </a:extLst>
+          </p:cNvPr>
+          <p:cNvSpPr>
+            <a:spLocks noGrp="1"/>
+          </p:cNvSpPr>
+          <p:nvPr>
+            <p:ph type="title"/>
+          </p:nvPr>
+        </p:nvSpPr>
+        <p:spPr>
+          <a:xfrm>
+            <a:off x="91323" y="176660"/>
+            <a:ext cx="5858215" cy="402692"/>
+          </a:xfrm>
+        </p:spPr>
+        <p:txBody>
+          <a:bodyPr>
+            <a:normAutofit fontScale="90000"/>
+          </a:bodyPr>
+          <a:lstStyle/>
+          <a:p>
+            <a:r>
+              <a:rPr lang="en-US" sz="3200" dirty="0"/>
+              <a:t>Narrative – Person of Interest Capture</a:t>
+            </a:r>
+          </a:p>
+        </p:txBody>
+      </p:sp>
+      <p:pic>
+        <p:nvPicPr>
+          <p:cNvPr id="4" name="Picture 3">
+            <a:extLst>
+              <a:ext uri="{FF2B5EF4-FFF2-40B4-BE49-F238E27FC236}">
+                <a16:creationId xmlns:a16="http://schemas.microsoft.com/office/drawing/2014/main" id="{519A9464-D2DB-F727-96E3-8AB56AA3CBA8}"/>
+              </a:ext>
+            </a:extLst>
+          </p:cNvPr>
+          <p:cNvPicPr>
+            <a:picLocks noChangeAspect="1"/>
+          </p:cNvPicPr>
+          <p:nvPr/>
+        </p:nvPicPr>
+        <p:blipFill>
+          <a:blip r:embed="rId2"/>
+          <a:stretch>
+            <a:fillRect/>
+          </a:stretch>
+        </p:blipFill>
+        <p:spPr>
+          <a:xfrm>
+            <a:off x="677870" y="1781867"/>
+            <a:ext cx="5271668" cy="3294266"/>
+          </a:xfrm>
+          <a:prstGeom prst="rect">
+            <a:avLst/>
+          </a:prstGeom>
+        </p:spPr>
+      </p:pic>
+      <p:pic>
+        <p:nvPicPr>
+          <p:cNvPr id="6" name="Picture 5">
+            <a:extLst>
+              <a:ext uri="{FF2B5EF4-FFF2-40B4-BE49-F238E27FC236}">
+                <a16:creationId xmlns:a16="http://schemas.microsoft.com/office/drawing/2014/main" id="{0C2520F9-0ED6-AF10-A6C8-42C9DBB890EA}"/>
+              </a:ext>
+            </a:extLst>
+          </p:cNvPr>
+          <p:cNvPicPr>
+            <a:picLocks noChangeAspect="1"/>
+          </p:cNvPicPr>
+          <p:nvPr/>
+        </p:nvPicPr>
+        <p:blipFill>
+          <a:blip r:embed="rId3"/>
+          <a:stretch>
+            <a:fillRect/>
+          </a:stretch>
+        </p:blipFill>
+        <p:spPr>
+          <a:xfrm>
+            <a:off x="6096000" y="1781867"/>
+            <a:ext cx="5949416" cy="3294266"/>
+          </a:xfrm>
+          <a:prstGeom prst="rect">
+            <a:avLst/>
+          </a:prstGeom>
+        </p:spPr>
+      </p:pic>
+      <p:sp>
+        <p:nvSpPr>
+          <p:cNvPr id="7" name="TextBox 6">
+            <a:extLst>
+              <a:ext uri="{FF2B5EF4-FFF2-40B4-BE49-F238E27FC236}">
+                <a16:creationId xmlns:a16="http://schemas.microsoft.com/office/drawing/2014/main" id="{ACA3FA73-8DE2-1115-3CAF-22AED98B91DC}"/>
+              </a:ext>
+            </a:extLst>
+          </p:cNvPr>
+          <p:cNvSpPr txBox="1"/>
+          <p:nvPr/>
+        </p:nvSpPr>
+        <p:spPr>
+          <a:xfrm>
+            <a:off x="879089" y="1412535"/>
+            <a:ext cx="11166327" cy="369332"/>
+          </a:xfrm>
+          <a:prstGeom prst="rect">
+            <a:avLst/>
+          </a:prstGeom>
+          <a:noFill/>
+        </p:spPr>
+        <p:txBody>
+          <a:bodyPr wrap="none" rtlCol="0">
+            <a:spAutoFit/>
+          </a:bodyPr>
+          <a:lstStyle/>
+          <a:p>
+            <a:r>
+              <a:rPr lang="en-US" dirty="0"/>
+              <a:t>Source: ADS-B Exchange, Flight DLH754 (</a:t>
+            </a:r>
+            <a:r>
+              <a:rPr lang="en-US" dirty="0">
+                <a:hlinkClick r:id="rId4"/>
+              </a:rPr>
+              <a:t>https://globe.adsbexchange.com/?icao=3c4b35</a:t>
+            </a:r>
+            <a:r>
+              <a:rPr lang="en-US" dirty="0"/>
+              <a:t>) 1429 EST 2 July 2024 </a:t>
+            </a:r>
+          </a:p>
+        </p:txBody>
+      </p:sp>
+      <p:pic>
+        <p:nvPicPr>
+          <p:cNvPr id="1026" name="Picture 2" descr="gif of the tumblr anon face ...">
+            <a:extLst>
+              <a:ext uri="{FF2B5EF4-FFF2-40B4-BE49-F238E27FC236}">
+                <a16:creationId xmlns:a16="http://schemas.microsoft.com/office/drawing/2014/main" id="{179B8034-698A-EC69-5365-87E27D57C608}"/>
+              </a:ext>
+            </a:extLst>
+          </p:cNvPr>
+          <p:cNvPicPr>
+            <a:picLocks noChangeAspect="1" noChangeArrowheads="1"/>
+          </p:cNvPicPr>
+          <p:nvPr/>
+        </p:nvPicPr>
+        <p:blipFill>
+          <a:blip r:embed="rId5">
+            <a:extLst>
+              <a:ext uri="{28A0092B-C50C-407E-A947-70E740481C1C}">
+                <a14:useLocalDpi xmlns:a14="http://schemas.microsoft.com/office/drawing/2010/main" val="0"/>
+              </a:ext>
+            </a:extLst>
+          </a:blip>
+          <a:srcRect/>
+          <a:stretch>
+            <a:fillRect/>
+          </a:stretch>
+        </p:blipFill>
+        <p:spPr bwMode="auto">
+          <a:xfrm>
+            <a:off x="7743640" y="2566267"/>
+            <a:ext cx="899556" cy="899556"/>
+          </a:xfrm>
+          <a:prstGeom prst="rect">
+            <a:avLst/>
+          </a:prstGeom>
+          <a:noFill/>
+          <a:extLst>
+            <a:ext uri="{909E8E84-426E-40DD-AFC4-6F175D3DCCD1}">
+              <a14:hiddenFill xmlns:a14="http://schemas.microsoft.com/office/drawing/2010/main">
+                <a:solidFill>
+                  <a:srgbClr val="FFFFFF"/>
+                </a:solidFill>
+              </a14:hiddenFill>
+            </a:ext>
+          </a:extLst>
+        </p:spPr>
+      </p:pic>
+      <p:sp>
+        <p:nvSpPr>
+          <p:cNvPr id="8" name="TextBox 7">
+            <a:extLst>
+              <a:ext uri="{FF2B5EF4-FFF2-40B4-BE49-F238E27FC236}">
+                <a16:creationId xmlns:a16="http://schemas.microsoft.com/office/drawing/2014/main" id="{B07F242B-6324-5558-0428-547F5AE38D40}"/>
+              </a:ext>
+            </a:extLst>
+          </p:cNvPr>
+          <p:cNvSpPr txBox="1"/>
+          <p:nvPr/>
+        </p:nvSpPr>
+        <p:spPr>
+          <a:xfrm>
+            <a:off x="782107" y="5076133"/>
+            <a:ext cx="4550733" cy="369332"/>
+          </a:xfrm>
+          <a:prstGeom prst="rect">
+            <a:avLst/>
+          </a:prstGeom>
+          <a:noFill/>
+        </p:spPr>
+        <p:txBody>
+          <a:bodyPr wrap="none" rtlCol="0">
+            <a:spAutoFit/>
+          </a:bodyPr>
+          <a:lstStyle/>
+          <a:p>
+            <a:r>
+              <a:rPr lang="en-US" dirty="0"/>
+              <a:t>Flight from Frankfurt Germany to Singapore. </a:t>
+            </a:r>
+          </a:p>
+        </p:txBody>
+      </p:sp>
+      <p:sp>
+        <p:nvSpPr>
+          <p:cNvPr id="9" name="TextBox 8">
+            <a:extLst>
+              <a:ext uri="{FF2B5EF4-FFF2-40B4-BE49-F238E27FC236}">
+                <a16:creationId xmlns:a16="http://schemas.microsoft.com/office/drawing/2014/main" id="{F0D01C1F-D6E2-5DB5-FADC-7C42CA50E8B3}"/>
+              </a:ext>
+            </a:extLst>
+          </p:cNvPr>
+          <p:cNvSpPr txBox="1"/>
+          <p:nvPr/>
+        </p:nvSpPr>
+        <p:spPr>
+          <a:xfrm>
+            <a:off x="782107" y="5445465"/>
+            <a:ext cx="8679940" cy="646331"/>
+          </a:xfrm>
+          <a:prstGeom prst="rect">
+            <a:avLst/>
+          </a:prstGeom>
+          <a:noFill/>
+        </p:spPr>
+        <p:txBody>
+          <a:bodyPr wrap="none" rtlCol="0">
+            <a:spAutoFit/>
+          </a:bodyPr>
+          <a:lstStyle/>
+          <a:p>
+            <a:r>
+              <a:rPr lang="en-US" dirty="0"/>
+              <a:t>Passenger of Interest outspoken against &amp; refugee from Iranian Govt living in Germany.</a:t>
+            </a:r>
+          </a:p>
+          <a:p>
+            <a:r>
+              <a:rPr lang="en-US" dirty="0"/>
+              <a:t>Can the Iranian regime force the plane to land while over their airspace? </a:t>
+            </a:r>
+          </a:p>
+        </p:txBody>
+      </p:sp>
+    </p:spTree>
+    <p:extLst>
+      <p:ext uri="{BB962C8B-B14F-4D97-AF65-F5344CB8AC3E}">
+        <p14:creationId xmlns:p14="http://schemas.microsoft.com/office/powerpoint/2010/main" val="2038829141"/>
+      </p:ext>
+    </p:extLst>
+  </p:cSld>
+  <p:clrMapOvr>
+    <a:masterClrMapping/>
+  </p:clrMapOvr>
+</p:sld>
+</file>
+
+<file path=ppt/slides/slide2.xml><?xml version="1.0" encoding="utf-8"?>
+<p:sld xmlns:a="http://schemas.openxmlformats.org/drawingml/2006/main" xmlns:r="http://schemas.openxmlformats.org/officeDocument/2006/relationships" xmlns:p="http://schemas.openxmlformats.org/presentationml/2006/main">
+  <p:cSld>
+    <p:spTree>
+      <p:nvGrpSpPr>
+        <p:cNvPr id="1" name=""/>
+        <p:cNvGrpSpPr/>
+        <p:nvPr/>
+      </p:nvGrpSpPr>
+      <p:grpSpPr>
+        <a:xfrm>
+          <a:off x="0" y="0"/>
+          <a:ext cx="0" cy="0"/>
+          <a:chOff x="0" y="0"/>
+          <a:chExt cx="0" cy="0"/>
+        </a:xfrm>
+      </p:grpSpPr>
+      <p:sp>
+        <p:nvSpPr>
+          <p:cNvPr id="2" name="Title 1">
+            <a:extLst>
+              <a:ext uri="{FF2B5EF4-FFF2-40B4-BE49-F238E27FC236}">
+                <a16:creationId xmlns:a16="http://schemas.microsoft.com/office/drawing/2014/main" id="{F836681C-4B70-DB2A-A328-C2C133370E87}"/>
+              </a:ext>
+            </a:extLst>
+          </p:cNvPr>
+          <p:cNvSpPr>
+            <a:spLocks noGrp="1"/>
+          </p:cNvSpPr>
+          <p:nvPr>
+            <p:ph type="title"/>
+          </p:nvPr>
+        </p:nvSpPr>
+        <p:spPr>
+          <a:xfrm>
+            <a:off x="91323" y="176660"/>
+            <a:ext cx="5858215" cy="402692"/>
+          </a:xfrm>
+        </p:spPr>
+        <p:txBody>
+          <a:bodyPr>
+            <a:normAutofit fontScale="90000"/>
+          </a:bodyPr>
+          <a:lstStyle/>
+          <a:p>
+            <a:r>
+              <a:rPr lang="en-US" sz="3200" dirty="0"/>
+              <a:t>Narrative – Person of Interest Capture</a:t>
+            </a:r>
+          </a:p>
+        </p:txBody>
+      </p:sp>
+      <p:sp>
+        <p:nvSpPr>
+          <p:cNvPr id="7" name="TextBox 6">
+            <a:extLst>
+              <a:ext uri="{FF2B5EF4-FFF2-40B4-BE49-F238E27FC236}">
+                <a16:creationId xmlns:a16="http://schemas.microsoft.com/office/drawing/2014/main" id="{ACA3FA73-8DE2-1115-3CAF-22AED98B91DC}"/>
+              </a:ext>
+            </a:extLst>
+          </p:cNvPr>
+          <p:cNvSpPr txBox="1"/>
+          <p:nvPr/>
+        </p:nvSpPr>
+        <p:spPr>
+          <a:xfrm>
+            <a:off x="879088" y="579352"/>
+            <a:ext cx="11166327" cy="369332"/>
+          </a:xfrm>
+          <a:prstGeom prst="rect">
+            <a:avLst/>
+          </a:prstGeom>
+          <a:noFill/>
+        </p:spPr>
+        <p:txBody>
+          <a:bodyPr wrap="none" rtlCol="0">
+            <a:spAutoFit/>
+          </a:bodyPr>
+          <a:lstStyle/>
+          <a:p>
+            <a:r>
+              <a:rPr lang="en-US" dirty="0"/>
+              <a:t>Source: ADS-B Exchange, Flight DLH754 (</a:t>
+            </a:r>
+            <a:r>
+              <a:rPr lang="en-US" dirty="0">
+                <a:hlinkClick r:id="rId2"/>
+              </a:rPr>
+              <a:t>https://globe.adsbexchange.com/?icao=3c4b35</a:t>
+            </a:r>
+            <a:r>
+              <a:rPr lang="en-US" dirty="0"/>
+              <a:t>) 1429 EST 2 July 2024 </a:t>
+            </a:r>
+          </a:p>
+        </p:txBody>
+      </p:sp>
+      <p:pic>
+        <p:nvPicPr>
+          <p:cNvPr id="5" name="Picture 4">
+            <a:extLst>
+              <a:ext uri="{FF2B5EF4-FFF2-40B4-BE49-F238E27FC236}">
+                <a16:creationId xmlns:a16="http://schemas.microsoft.com/office/drawing/2014/main" id="{DDB09990-9498-A209-1022-AC97CF4C9280}"/>
+              </a:ext>
+            </a:extLst>
+          </p:cNvPr>
+          <p:cNvPicPr>
+            <a:picLocks noChangeAspect="1"/>
+          </p:cNvPicPr>
+          <p:nvPr/>
+        </p:nvPicPr>
+        <p:blipFill>
+          <a:blip r:embed="rId3"/>
+          <a:stretch>
+            <a:fillRect/>
+          </a:stretch>
+        </p:blipFill>
+        <p:spPr>
+          <a:xfrm>
+            <a:off x="2327262" y="948684"/>
+            <a:ext cx="7244551" cy="5484431"/>
+          </a:xfrm>
+          <a:prstGeom prst="rect">
+            <a:avLst/>
+          </a:prstGeom>
+        </p:spPr>
+      </p:pic>
+    </p:spTree>
+    <p:extLst>
+      <p:ext uri="{BB962C8B-B14F-4D97-AF65-F5344CB8AC3E}">
+        <p14:creationId xmlns:p14="http://schemas.microsoft.com/office/powerpoint/2010/main" val="2472387163"/>
+      </p:ext>
+    </p:extLst>
+  </p:cSld>
+  <p:clrMapOvr>
+    <a:masterClrMapping/>
+  </p:clrMapOvr>
+</p:sld>
+</file>
+
+<file path=ppt/slides/slide3.xml><?xml version="1.0" encoding="utf-8"?>
+<p:sld xmlns:a="http://schemas.openxmlformats.org/drawingml/2006/main" xmlns:r="http://schemas.openxmlformats.org/officeDocument/2006/relationships" xmlns:p="http://schemas.openxmlformats.org/presentationml/2006/main">
+  <p:cSld>
+    <p:spTree>
+      <p:nvGrpSpPr>
+        <p:cNvPr id="1" name=""/>
+        <p:cNvGrpSpPr/>
+        <p:nvPr/>
+      </p:nvGrpSpPr>
+      <p:grpSpPr>
+        <a:xfrm>
+          <a:off x="0" y="0"/>
+          <a:ext cx="0" cy="0"/>
+          <a:chOff x="0" y="0"/>
+          <a:chExt cx="0" cy="0"/>
+        </a:xfrm>
+      </p:grpSpPr>
+      <p:sp>
+        <p:nvSpPr>
+          <p:cNvPr id="2" name="Title 1">
+            <a:extLst>
+              <a:ext uri="{FF2B5EF4-FFF2-40B4-BE49-F238E27FC236}">
+                <a16:creationId xmlns:a16="http://schemas.microsoft.com/office/drawing/2014/main" id="{F836681C-4B70-DB2A-A328-C2C133370E87}"/>
+              </a:ext>
+            </a:extLst>
+          </p:cNvPr>
+          <p:cNvSpPr>
+            <a:spLocks noGrp="1"/>
+          </p:cNvSpPr>
+          <p:nvPr>
+            <p:ph type="title"/>
+          </p:nvPr>
+        </p:nvSpPr>
+        <p:spPr>
+          <a:xfrm>
+            <a:off x="91323" y="176660"/>
+            <a:ext cx="5786963" cy="402692"/>
+          </a:xfrm>
+        </p:spPr>
+        <p:txBody>
+          <a:bodyPr>
+            <a:normAutofit fontScale="90000"/>
+          </a:bodyPr>
+          <a:lstStyle/>
+          <a:p>
+            <a:r>
+              <a:rPr lang="en-US" sz="3200" dirty="0"/>
+              <a:t>Attack Path – Nothing complicated </a:t>
+            </a:r>
+          </a:p>
+        </p:txBody>
+      </p:sp>
+      <p:sp>
+        <p:nvSpPr>
+          <p:cNvPr id="79" name="Rectangle: Rounded Corners 78">
+            <a:extLst>
+              <a:ext uri="{FF2B5EF4-FFF2-40B4-BE49-F238E27FC236}">
+                <a16:creationId xmlns:a16="http://schemas.microsoft.com/office/drawing/2014/main" id="{650A4D6F-44D7-F7F1-8007-E234C65483F2}"/>
               </a:ext>
             </a:extLst>
           </p:cNvPr>
@@ -3340,16 +3810,12 @@
         </p:nvSpPr>
         <p:spPr>
           <a:xfrm>
-            <a:off x="365761" y="858129"/>
-            <a:ext cx="7230794" cy="5219114"/>
+            <a:off x="2325242" y="5647722"/>
+            <a:ext cx="1137765" cy="474650"/>
           </a:xfrm>
           <a:prstGeom prst="roundRect">
             <a:avLst/>
           </a:prstGeom>
-          <a:noFill/>
-          <a:ln w="28575">
-            <a:prstDash val="lgDash"/>
-          </a:ln>
         </p:spPr>
         <p:style>
           <a:lnRef idx="2">
@@ -3372,1047 +3838,41 @@
           <a:lstStyle/>
           <a:p>
             <a:pPr algn="ctr"/>
-            <a:endParaRPr lang="en-US"/>
-          </a:p>
-        </p:txBody>
-      </p:sp>
-      <p:sp>
-        <p:nvSpPr>
-          <p:cNvPr id="2" name="Title 1">
-            <a:extLst>
-              <a:ext uri="{FF2B5EF4-FFF2-40B4-BE49-F238E27FC236}">
-                <a16:creationId xmlns:a16="http://schemas.microsoft.com/office/drawing/2014/main" id="{F836681C-4B70-DB2A-A328-C2C133370E87}"/>
-              </a:ext>
-            </a:extLst>
-          </p:cNvPr>
-          <p:cNvSpPr>
-            <a:spLocks noGrp="1"/>
-          </p:cNvSpPr>
-          <p:nvPr>
-            <p:ph type="title"/>
-          </p:nvPr>
-        </p:nvSpPr>
-        <p:spPr>
-          <a:xfrm>
-            <a:off x="91323" y="176660"/>
-            <a:ext cx="3587217" cy="402692"/>
-          </a:xfrm>
-        </p:spPr>
-        <p:txBody>
-          <a:bodyPr>
-            <a:normAutofit fontScale="90000"/>
-          </a:bodyPr>
-          <a:lstStyle/>
-          <a:p>
-            <a:r>
-              <a:rPr lang="en-US" sz="3200" dirty="0"/>
-              <a:t>Flight Management Computer LRU Design</a:t>
-            </a:r>
-          </a:p>
-        </p:txBody>
-      </p:sp>
-      <p:grpSp>
-        <p:nvGrpSpPr>
-          <p:cNvPr id="9" name="Group 8">
-            <a:extLst>
-              <a:ext uri="{FF2B5EF4-FFF2-40B4-BE49-F238E27FC236}">
-                <a16:creationId xmlns:a16="http://schemas.microsoft.com/office/drawing/2014/main" id="{88D9F073-4E8A-D214-C4F5-AC659EBD6986}"/>
-              </a:ext>
-            </a:extLst>
-          </p:cNvPr>
-          <p:cNvGrpSpPr/>
-          <p:nvPr/>
-        </p:nvGrpSpPr>
-        <p:grpSpPr>
-          <a:xfrm>
-            <a:off x="10030477" y="2076596"/>
-            <a:ext cx="1137767" cy="2704808"/>
-            <a:chOff x="10030477" y="732916"/>
-            <a:chExt cx="1137767" cy="2704808"/>
-          </a:xfrm>
-        </p:grpSpPr>
-        <p:sp>
-          <p:nvSpPr>
-            <p:cNvPr id="5" name="Rectangle: Rounded Corners 4">
-              <a:extLst>
-                <a:ext uri="{FF2B5EF4-FFF2-40B4-BE49-F238E27FC236}">
-                  <a16:creationId xmlns:a16="http://schemas.microsoft.com/office/drawing/2014/main" id="{12CC84E8-8ED9-4CAA-9771-F072FE7A1008}"/>
-                </a:ext>
-              </a:extLst>
-            </p:cNvPr>
-            <p:cNvSpPr/>
-            <p:nvPr/>
-          </p:nvSpPr>
-          <p:spPr>
-            <a:xfrm>
-              <a:off x="10030479" y="732916"/>
-              <a:ext cx="1137765" cy="474650"/>
-            </a:xfrm>
-            <a:prstGeom prst="roundRect">
-              <a:avLst/>
-            </a:prstGeom>
-          </p:spPr>
-          <p:style>
-            <a:lnRef idx="2">
-              <a:schemeClr val="accent1">
-                <a:shade val="15000"/>
-              </a:schemeClr>
-            </a:lnRef>
-            <a:fillRef idx="1">
-              <a:schemeClr val="accent1"/>
-            </a:fillRef>
-            <a:effectRef idx="0">
-              <a:schemeClr val="accent1"/>
-            </a:effectRef>
-            <a:fontRef idx="minor">
-              <a:schemeClr val="lt1"/>
-            </a:fontRef>
-          </p:style>
-          <p:txBody>
-            <a:bodyPr rtlCol="0" anchor="ctr"/>
-            <a:lstStyle/>
-            <a:p>
-              <a:pPr algn="ctr"/>
-              <a:r>
-                <a:rPr lang="en-US" sz="1100" dirty="0"/>
-                <a:t>Radio Management System</a:t>
-              </a:r>
-            </a:p>
-          </p:txBody>
-        </p:sp>
-        <p:sp>
-          <p:nvSpPr>
-            <p:cNvPr id="6" name="Rectangle: Rounded Corners 5">
-              <a:extLst>
-                <a:ext uri="{FF2B5EF4-FFF2-40B4-BE49-F238E27FC236}">
-                  <a16:creationId xmlns:a16="http://schemas.microsoft.com/office/drawing/2014/main" id="{76AAC610-840A-CBCE-6575-BB3657FC7D54}"/>
-                </a:ext>
-              </a:extLst>
-            </p:cNvPr>
-            <p:cNvSpPr/>
-            <p:nvPr/>
-          </p:nvSpPr>
-          <p:spPr>
-            <a:xfrm>
-              <a:off x="10030477" y="2963074"/>
-              <a:ext cx="1137765" cy="474650"/>
-            </a:xfrm>
-            <a:prstGeom prst="roundRect">
-              <a:avLst/>
-            </a:prstGeom>
-          </p:spPr>
-          <p:style>
-            <a:lnRef idx="2">
-              <a:schemeClr val="accent1">
-                <a:shade val="15000"/>
-              </a:schemeClr>
-            </a:lnRef>
-            <a:fillRef idx="1">
-              <a:schemeClr val="accent1"/>
-            </a:fillRef>
-            <a:effectRef idx="0">
-              <a:schemeClr val="accent1"/>
-            </a:effectRef>
-            <a:fontRef idx="minor">
-              <a:schemeClr val="lt1"/>
-            </a:fontRef>
-          </p:style>
-          <p:txBody>
-            <a:bodyPr rtlCol="0" anchor="ctr"/>
-            <a:lstStyle/>
-            <a:p>
-              <a:pPr algn="ctr"/>
-              <a:r>
-                <a:rPr lang="en-US" sz="1100" dirty="0"/>
-                <a:t>Engine Control - LEFT</a:t>
-              </a:r>
-            </a:p>
-          </p:txBody>
-        </p:sp>
-        <p:sp>
-          <p:nvSpPr>
-            <p:cNvPr id="7" name="Rectangle: Rounded Corners 6">
-              <a:extLst>
-                <a:ext uri="{FF2B5EF4-FFF2-40B4-BE49-F238E27FC236}">
-                  <a16:creationId xmlns:a16="http://schemas.microsoft.com/office/drawing/2014/main" id="{63936EDF-BF7E-7AF9-8242-9A8AE76AFFBB}"/>
-                </a:ext>
-              </a:extLst>
-            </p:cNvPr>
-            <p:cNvSpPr/>
-            <p:nvPr/>
-          </p:nvSpPr>
-          <p:spPr>
-            <a:xfrm>
-              <a:off x="10030478" y="2219688"/>
-              <a:ext cx="1137765" cy="474650"/>
-            </a:xfrm>
-            <a:prstGeom prst="roundRect">
-              <a:avLst/>
-            </a:prstGeom>
-          </p:spPr>
-          <p:style>
-            <a:lnRef idx="2">
-              <a:schemeClr val="accent1">
-                <a:shade val="15000"/>
-              </a:schemeClr>
-            </a:lnRef>
-            <a:fillRef idx="1">
-              <a:schemeClr val="accent1"/>
-            </a:fillRef>
-            <a:effectRef idx="0">
-              <a:schemeClr val="accent1"/>
-            </a:effectRef>
-            <a:fontRef idx="minor">
-              <a:schemeClr val="lt1"/>
-            </a:fontRef>
-          </p:style>
-          <p:txBody>
-            <a:bodyPr rtlCol="0" anchor="ctr"/>
-            <a:lstStyle/>
-            <a:p>
-              <a:pPr algn="ctr"/>
-              <a:r>
-                <a:rPr lang="en-US" sz="1100" dirty="0"/>
-                <a:t>Weight and Balance System</a:t>
-              </a:r>
-            </a:p>
-          </p:txBody>
-        </p:sp>
-        <p:sp>
-          <p:nvSpPr>
-            <p:cNvPr id="8" name="Rectangle: Rounded Corners 7">
-              <a:extLst>
-                <a:ext uri="{FF2B5EF4-FFF2-40B4-BE49-F238E27FC236}">
-                  <a16:creationId xmlns:a16="http://schemas.microsoft.com/office/drawing/2014/main" id="{69684B3E-A751-434D-59BE-7A5041DF3550}"/>
-                </a:ext>
-              </a:extLst>
-            </p:cNvPr>
-            <p:cNvSpPr/>
-            <p:nvPr/>
-          </p:nvSpPr>
-          <p:spPr>
-            <a:xfrm>
-              <a:off x="10030478" y="1476302"/>
-              <a:ext cx="1137765" cy="474650"/>
-            </a:xfrm>
-            <a:prstGeom prst="roundRect">
-              <a:avLst/>
-            </a:prstGeom>
-          </p:spPr>
-          <p:style>
-            <a:lnRef idx="2">
-              <a:schemeClr val="accent1">
-                <a:shade val="15000"/>
-              </a:schemeClr>
-            </a:lnRef>
-            <a:fillRef idx="1">
-              <a:schemeClr val="accent1"/>
-            </a:fillRef>
-            <a:effectRef idx="0">
-              <a:schemeClr val="accent1"/>
-            </a:effectRef>
-            <a:fontRef idx="minor">
-              <a:schemeClr val="lt1"/>
-            </a:fontRef>
-          </p:style>
-          <p:txBody>
-            <a:bodyPr rtlCol="0" anchor="ctr"/>
-            <a:lstStyle/>
-            <a:p>
-              <a:pPr algn="ctr"/>
-              <a:r>
-                <a:rPr lang="en-US" sz="1100" dirty="0"/>
-                <a:t>Engine Control - RIGHT</a:t>
-              </a:r>
-            </a:p>
-          </p:txBody>
-        </p:sp>
-      </p:grpSp>
-      <p:sp>
-        <p:nvSpPr>
-          <p:cNvPr id="10" name="Rectangle 9">
-            <a:extLst>
-              <a:ext uri="{FF2B5EF4-FFF2-40B4-BE49-F238E27FC236}">
-                <a16:creationId xmlns:a16="http://schemas.microsoft.com/office/drawing/2014/main" id="{88BDB229-C0BE-F1CD-21CD-A11ED99EFBAB}"/>
-              </a:ext>
-            </a:extLst>
-          </p:cNvPr>
-          <p:cNvSpPr/>
-          <p:nvPr/>
-        </p:nvSpPr>
-        <p:spPr>
-          <a:xfrm>
-            <a:off x="6240255" y="2784208"/>
-            <a:ext cx="1289583" cy="1289583"/>
-          </a:xfrm>
-          <a:prstGeom prst="rect">
-            <a:avLst/>
-          </a:prstGeom>
-        </p:spPr>
-        <p:style>
-          <a:lnRef idx="2">
-            <a:schemeClr val="accent1">
-              <a:shade val="15000"/>
-            </a:schemeClr>
-          </a:lnRef>
-          <a:fillRef idx="1">
-            <a:schemeClr val="accent1"/>
-          </a:fillRef>
-          <a:effectRef idx="0">
-            <a:schemeClr val="accent1"/>
-          </a:effectRef>
-          <a:fontRef idx="minor">
-            <a:schemeClr val="lt1"/>
-          </a:fontRef>
-        </p:style>
-        <p:txBody>
-          <a:bodyPr rtlCol="0" anchor="ctr"/>
-          <a:lstStyle/>
-          <a:p>
-            <a:pPr algn="ctr"/>
-            <a:r>
-              <a:rPr lang="en-US" dirty="0"/>
-              <a:t>Generate Voltage for Word</a:t>
-            </a:r>
-          </a:p>
-        </p:txBody>
-      </p:sp>
-      <p:grpSp>
-        <p:nvGrpSpPr>
-          <p:cNvPr id="19" name="Group 18">
-            <a:extLst>
-              <a:ext uri="{FF2B5EF4-FFF2-40B4-BE49-F238E27FC236}">
-                <a16:creationId xmlns:a16="http://schemas.microsoft.com/office/drawing/2014/main" id="{4A4976FE-8485-0FEF-59E5-EAD77650707E}"/>
-              </a:ext>
-            </a:extLst>
-          </p:cNvPr>
-          <p:cNvGrpSpPr/>
-          <p:nvPr/>
-        </p:nvGrpSpPr>
-        <p:grpSpPr>
-          <a:xfrm>
-            <a:off x="7529838" y="2313921"/>
-            <a:ext cx="2500641" cy="2230158"/>
-            <a:chOff x="7529838" y="2313921"/>
-            <a:chExt cx="2500641" cy="2230158"/>
-          </a:xfrm>
-        </p:grpSpPr>
-        <p:cxnSp>
-          <p:nvCxnSpPr>
-            <p:cNvPr id="12" name="Connector: Elbow 11">
-              <a:extLst>
-                <a:ext uri="{FF2B5EF4-FFF2-40B4-BE49-F238E27FC236}">
-                  <a16:creationId xmlns:a16="http://schemas.microsoft.com/office/drawing/2014/main" id="{1DA43409-E64D-B925-69F0-245109993F8A}"/>
-                </a:ext>
-              </a:extLst>
-            </p:cNvPr>
-            <p:cNvCxnSpPr>
-              <a:stCxn id="10" idx="3"/>
-              <a:endCxn id="5" idx="1"/>
-            </p:cNvCxnSpPr>
-            <p:nvPr/>
-          </p:nvCxnSpPr>
-          <p:spPr>
-            <a:xfrm flipV="1">
-              <a:off x="7529838" y="2313921"/>
-              <a:ext cx="2500641" cy="1115079"/>
-            </a:xfrm>
-            <a:prstGeom prst="bentConnector3">
-              <a:avLst/>
-            </a:prstGeom>
-            <a:ln w="57150">
-              <a:solidFill>
-                <a:srgbClr val="7030A0"/>
-              </a:solidFill>
-              <a:prstDash val="sysDash"/>
-              <a:tailEnd type="triangle"/>
-            </a:ln>
-          </p:spPr>
-          <p:style>
-            <a:lnRef idx="2">
-              <a:schemeClr val="accent1"/>
-            </a:lnRef>
-            <a:fillRef idx="0">
-              <a:schemeClr val="accent1"/>
-            </a:fillRef>
-            <a:effectRef idx="1">
-              <a:schemeClr val="accent1"/>
-            </a:effectRef>
-            <a:fontRef idx="minor">
-              <a:schemeClr val="tx1"/>
-            </a:fontRef>
-          </p:style>
-        </p:cxnSp>
-        <p:cxnSp>
-          <p:nvCxnSpPr>
-            <p:cNvPr id="14" name="Connector: Elbow 13">
-              <a:extLst>
-                <a:ext uri="{FF2B5EF4-FFF2-40B4-BE49-F238E27FC236}">
-                  <a16:creationId xmlns:a16="http://schemas.microsoft.com/office/drawing/2014/main" id="{6B73CCE4-4D7A-A728-7BD3-2BA31F605387}"/>
-                </a:ext>
-              </a:extLst>
-            </p:cNvPr>
-            <p:cNvCxnSpPr>
-              <a:stCxn id="10" idx="3"/>
-              <a:endCxn id="6" idx="1"/>
-            </p:cNvCxnSpPr>
-            <p:nvPr/>
-          </p:nvCxnSpPr>
-          <p:spPr>
-            <a:xfrm>
-              <a:off x="7529838" y="3429000"/>
-              <a:ext cx="2500639" cy="1115079"/>
-            </a:xfrm>
-            <a:prstGeom prst="bentConnector3">
-              <a:avLst/>
-            </a:prstGeom>
-            <a:ln w="57150">
-              <a:solidFill>
-                <a:srgbClr val="7030A0"/>
-              </a:solidFill>
-              <a:prstDash val="sysDash"/>
-              <a:tailEnd type="triangle"/>
-            </a:ln>
-          </p:spPr>
-          <p:style>
-            <a:lnRef idx="2">
-              <a:schemeClr val="accent1"/>
-            </a:lnRef>
-            <a:fillRef idx="0">
-              <a:schemeClr val="accent1"/>
-            </a:fillRef>
-            <a:effectRef idx="1">
-              <a:schemeClr val="accent1"/>
-            </a:effectRef>
-            <a:fontRef idx="minor">
-              <a:schemeClr val="tx1"/>
-            </a:fontRef>
-          </p:style>
-        </p:cxnSp>
-        <p:cxnSp>
-          <p:nvCxnSpPr>
-            <p:cNvPr id="16" name="Connector: Elbow 15">
-              <a:extLst>
-                <a:ext uri="{FF2B5EF4-FFF2-40B4-BE49-F238E27FC236}">
-                  <a16:creationId xmlns:a16="http://schemas.microsoft.com/office/drawing/2014/main" id="{AC422BFF-5262-8C86-6A9C-3C711BCBFCB2}"/>
-                </a:ext>
-              </a:extLst>
-            </p:cNvPr>
-            <p:cNvCxnSpPr>
-              <a:stCxn id="10" idx="3"/>
-              <a:endCxn id="8" idx="1"/>
-            </p:cNvCxnSpPr>
-            <p:nvPr/>
-          </p:nvCxnSpPr>
-          <p:spPr>
-            <a:xfrm flipV="1">
-              <a:off x="7529838" y="3057307"/>
-              <a:ext cx="2500640" cy="371693"/>
-            </a:xfrm>
-            <a:prstGeom prst="bentConnector3">
-              <a:avLst/>
-            </a:prstGeom>
-            <a:ln w="57150">
-              <a:solidFill>
-                <a:srgbClr val="7030A0"/>
-              </a:solidFill>
-              <a:prstDash val="sysDash"/>
-              <a:tailEnd type="triangle"/>
-            </a:ln>
-          </p:spPr>
-          <p:style>
-            <a:lnRef idx="2">
-              <a:schemeClr val="accent1"/>
-            </a:lnRef>
-            <a:fillRef idx="0">
-              <a:schemeClr val="accent1"/>
-            </a:fillRef>
-            <a:effectRef idx="1">
-              <a:schemeClr val="accent1"/>
-            </a:effectRef>
-            <a:fontRef idx="minor">
-              <a:schemeClr val="tx1"/>
-            </a:fontRef>
-          </p:style>
-        </p:cxnSp>
-        <p:cxnSp>
-          <p:nvCxnSpPr>
-            <p:cNvPr id="18" name="Connector: Elbow 17">
-              <a:extLst>
-                <a:ext uri="{FF2B5EF4-FFF2-40B4-BE49-F238E27FC236}">
-                  <a16:creationId xmlns:a16="http://schemas.microsoft.com/office/drawing/2014/main" id="{D6F6B446-5F23-82A0-D4A2-9D42FFEFE6A2}"/>
-                </a:ext>
-              </a:extLst>
-            </p:cNvPr>
-            <p:cNvCxnSpPr>
-              <a:stCxn id="10" idx="3"/>
-              <a:endCxn id="7" idx="1"/>
-            </p:cNvCxnSpPr>
-            <p:nvPr/>
-          </p:nvCxnSpPr>
-          <p:spPr>
-            <a:xfrm>
-              <a:off x="7529838" y="3429000"/>
-              <a:ext cx="2500640" cy="371693"/>
-            </a:xfrm>
-            <a:prstGeom prst="bentConnector3">
-              <a:avLst/>
-            </a:prstGeom>
-            <a:ln w="57150">
-              <a:solidFill>
-                <a:srgbClr val="7030A0"/>
-              </a:solidFill>
-              <a:prstDash val="sysDash"/>
-              <a:tailEnd type="triangle"/>
-            </a:ln>
-          </p:spPr>
-          <p:style>
-            <a:lnRef idx="2">
-              <a:schemeClr val="accent1"/>
-            </a:lnRef>
-            <a:fillRef idx="0">
-              <a:schemeClr val="accent1"/>
-            </a:fillRef>
-            <a:effectRef idx="1">
-              <a:schemeClr val="accent1"/>
-            </a:effectRef>
-            <a:fontRef idx="minor">
-              <a:schemeClr val="tx1"/>
-            </a:fontRef>
-          </p:style>
-        </p:cxnSp>
-      </p:grpSp>
-      <p:grpSp>
-        <p:nvGrpSpPr>
-          <p:cNvPr id="44" name="Group 43">
-            <a:extLst>
-              <a:ext uri="{FF2B5EF4-FFF2-40B4-BE49-F238E27FC236}">
-                <a16:creationId xmlns:a16="http://schemas.microsoft.com/office/drawing/2014/main" id="{D576B965-4AFD-8337-9345-99A87BEB9200}"/>
-              </a:ext>
-            </a:extLst>
-          </p:cNvPr>
-          <p:cNvGrpSpPr/>
-          <p:nvPr/>
-        </p:nvGrpSpPr>
-        <p:grpSpPr>
-          <a:xfrm>
-            <a:off x="7529834" y="2163847"/>
-            <a:ext cx="2500643" cy="2257207"/>
-            <a:chOff x="7529834" y="2163847"/>
-            <a:chExt cx="2500643" cy="2257207"/>
-          </a:xfrm>
-        </p:grpSpPr>
-        <p:cxnSp>
-          <p:nvCxnSpPr>
-            <p:cNvPr id="31" name="Connector: Elbow 30">
-              <a:extLst>
-                <a:ext uri="{FF2B5EF4-FFF2-40B4-BE49-F238E27FC236}">
-                  <a16:creationId xmlns:a16="http://schemas.microsoft.com/office/drawing/2014/main" id="{D7FF5907-9A25-7995-A381-180395075AE8}"/>
-                </a:ext>
-              </a:extLst>
-            </p:cNvPr>
-            <p:cNvCxnSpPr/>
-            <p:nvPr/>
-          </p:nvCxnSpPr>
-          <p:spPr>
-            <a:xfrm flipV="1">
-              <a:off x="7529838" y="2163847"/>
-              <a:ext cx="2500639" cy="893460"/>
-            </a:xfrm>
-            <a:prstGeom prst="bentConnector3">
-              <a:avLst>
-                <a:gd name="adj1" fmla="val 41905"/>
-              </a:avLst>
-            </a:prstGeom>
-            <a:ln w="57150">
-              <a:solidFill>
-                <a:srgbClr val="00B050"/>
-              </a:solidFill>
-              <a:prstDash val="sysDash"/>
-              <a:tailEnd type="triangle"/>
-            </a:ln>
-          </p:spPr>
-          <p:style>
-            <a:lnRef idx="2">
-              <a:schemeClr val="accent1"/>
-            </a:lnRef>
-            <a:fillRef idx="0">
-              <a:schemeClr val="accent1"/>
-            </a:fillRef>
-            <a:effectRef idx="1">
-              <a:schemeClr val="accent1"/>
-            </a:effectRef>
-            <a:fontRef idx="minor">
-              <a:schemeClr val="tx1"/>
-            </a:fontRef>
-          </p:style>
-        </p:cxnSp>
-        <p:cxnSp>
-          <p:nvCxnSpPr>
-            <p:cNvPr id="33" name="Connector: Elbow 32">
-              <a:extLst>
-                <a:ext uri="{FF2B5EF4-FFF2-40B4-BE49-F238E27FC236}">
-                  <a16:creationId xmlns:a16="http://schemas.microsoft.com/office/drawing/2014/main" id="{6959983E-EF83-B372-3669-D9A9C70BB76B}"/>
-                </a:ext>
-              </a:extLst>
-            </p:cNvPr>
-            <p:cNvCxnSpPr>
-              <a:cxnSpLocks/>
-            </p:cNvCxnSpPr>
-            <p:nvPr/>
-          </p:nvCxnSpPr>
-          <p:spPr>
-            <a:xfrm flipV="1">
-              <a:off x="7529837" y="2922939"/>
-              <a:ext cx="2500640" cy="134368"/>
-            </a:xfrm>
-            <a:prstGeom prst="bentConnector3">
-              <a:avLst>
-                <a:gd name="adj1" fmla="val 41905"/>
-              </a:avLst>
-            </a:prstGeom>
-            <a:ln w="57150">
-              <a:solidFill>
-                <a:srgbClr val="00B050"/>
-              </a:solidFill>
-              <a:prstDash val="sysDash"/>
-              <a:tailEnd type="triangle"/>
-            </a:ln>
-          </p:spPr>
-          <p:style>
-            <a:lnRef idx="2">
-              <a:schemeClr val="accent1"/>
-            </a:lnRef>
-            <a:fillRef idx="0">
-              <a:schemeClr val="accent1"/>
-            </a:fillRef>
-            <a:effectRef idx="1">
-              <a:schemeClr val="accent1"/>
-            </a:effectRef>
-            <a:fontRef idx="minor">
-              <a:schemeClr val="tx1"/>
-            </a:fontRef>
-          </p:style>
-        </p:cxnSp>
-        <p:cxnSp>
-          <p:nvCxnSpPr>
-            <p:cNvPr id="38" name="Connector: Elbow 37">
-              <a:extLst>
-                <a:ext uri="{FF2B5EF4-FFF2-40B4-BE49-F238E27FC236}">
-                  <a16:creationId xmlns:a16="http://schemas.microsoft.com/office/drawing/2014/main" id="{45943C84-D1AB-09AA-ECAF-9D5EDADC04E6}"/>
-                </a:ext>
-              </a:extLst>
-            </p:cNvPr>
-            <p:cNvCxnSpPr>
-              <a:cxnSpLocks/>
-            </p:cNvCxnSpPr>
-            <p:nvPr/>
-          </p:nvCxnSpPr>
-          <p:spPr>
-            <a:xfrm>
-              <a:off x="7529835" y="3057307"/>
-              <a:ext cx="2500642" cy="609018"/>
-            </a:xfrm>
-            <a:prstGeom prst="bentConnector3">
-              <a:avLst>
-                <a:gd name="adj1" fmla="val 41905"/>
-              </a:avLst>
-            </a:prstGeom>
-            <a:ln w="57150">
-              <a:solidFill>
-                <a:srgbClr val="00B050"/>
-              </a:solidFill>
-              <a:prstDash val="sysDash"/>
-              <a:tailEnd type="triangle"/>
-            </a:ln>
-          </p:spPr>
-          <p:style>
-            <a:lnRef idx="2">
-              <a:schemeClr val="accent1"/>
-            </a:lnRef>
-            <a:fillRef idx="0">
-              <a:schemeClr val="accent1"/>
-            </a:fillRef>
-            <a:effectRef idx="1">
-              <a:schemeClr val="accent1"/>
-            </a:effectRef>
-            <a:fontRef idx="minor">
-              <a:schemeClr val="tx1"/>
-            </a:fontRef>
-          </p:style>
-        </p:cxnSp>
-        <p:cxnSp>
-          <p:nvCxnSpPr>
-            <p:cNvPr id="41" name="Connector: Elbow 40">
-              <a:extLst>
-                <a:ext uri="{FF2B5EF4-FFF2-40B4-BE49-F238E27FC236}">
-                  <a16:creationId xmlns:a16="http://schemas.microsoft.com/office/drawing/2014/main" id="{B0070B55-2314-C5CB-3DA2-9C276F220CEC}"/>
-                </a:ext>
-              </a:extLst>
-            </p:cNvPr>
-            <p:cNvCxnSpPr>
-              <a:cxnSpLocks/>
-            </p:cNvCxnSpPr>
-            <p:nvPr/>
-          </p:nvCxnSpPr>
-          <p:spPr>
-            <a:xfrm>
-              <a:off x="7529834" y="3057307"/>
-              <a:ext cx="2500643" cy="1363747"/>
-            </a:xfrm>
-            <a:prstGeom prst="bentConnector3">
-              <a:avLst>
-                <a:gd name="adj1" fmla="val 41905"/>
-              </a:avLst>
-            </a:prstGeom>
-            <a:ln w="57150">
-              <a:solidFill>
-                <a:srgbClr val="00B050"/>
-              </a:solidFill>
-              <a:prstDash val="sysDash"/>
-              <a:tailEnd type="triangle"/>
-            </a:ln>
-          </p:spPr>
-          <p:style>
-            <a:lnRef idx="2">
-              <a:schemeClr val="accent1"/>
-            </a:lnRef>
-            <a:fillRef idx="0">
-              <a:schemeClr val="accent1"/>
-            </a:fillRef>
-            <a:effectRef idx="1">
-              <a:schemeClr val="accent1"/>
-            </a:effectRef>
-            <a:fontRef idx="minor">
-              <a:schemeClr val="tx1"/>
-            </a:fontRef>
-          </p:style>
-        </p:cxnSp>
-      </p:grpSp>
-      <p:sp>
-        <p:nvSpPr>
-          <p:cNvPr id="45" name="TextBox 44">
-            <a:extLst>
-              <a:ext uri="{FF2B5EF4-FFF2-40B4-BE49-F238E27FC236}">
-                <a16:creationId xmlns:a16="http://schemas.microsoft.com/office/drawing/2014/main" id="{4C454944-5920-22AB-3C78-0468ED3D902B}"/>
-              </a:ext>
-            </a:extLst>
-          </p:cNvPr>
-          <p:cNvSpPr txBox="1"/>
-          <p:nvPr/>
-        </p:nvSpPr>
-        <p:spPr>
-          <a:xfrm>
-            <a:off x="7529832" y="2784208"/>
-            <a:ext cx="987771" cy="307777"/>
-          </a:xfrm>
-          <a:prstGeom prst="rect">
-            <a:avLst/>
-          </a:prstGeom>
-          <a:noFill/>
-          <a:ln>
-            <a:noFill/>
-          </a:ln>
-        </p:spPr>
-        <p:txBody>
-          <a:bodyPr wrap="none" rtlCol="0">
-            <a:spAutoFit/>
-          </a:bodyPr>
-          <a:lstStyle/>
-          <a:p>
-            <a:r>
-              <a:rPr lang="en-US" sz="1400" dirty="0">
-                <a:solidFill>
-                  <a:srgbClr val="00B050"/>
-                </a:solidFill>
-              </a:rPr>
-              <a:t>Channel A</a:t>
-            </a:r>
-          </a:p>
-        </p:txBody>
-      </p:sp>
-      <p:sp>
-        <p:nvSpPr>
-          <p:cNvPr id="46" name="TextBox 45">
-            <a:extLst>
-              <a:ext uri="{FF2B5EF4-FFF2-40B4-BE49-F238E27FC236}">
-                <a16:creationId xmlns:a16="http://schemas.microsoft.com/office/drawing/2014/main" id="{202F6130-7D42-643E-B425-E93EFF6C6CB2}"/>
-              </a:ext>
-            </a:extLst>
-          </p:cNvPr>
-          <p:cNvSpPr txBox="1"/>
-          <p:nvPr/>
-        </p:nvSpPr>
-        <p:spPr>
-          <a:xfrm>
-            <a:off x="7529832" y="3132130"/>
-            <a:ext cx="990977" cy="307777"/>
-          </a:xfrm>
-          <a:prstGeom prst="rect">
-            <a:avLst/>
-          </a:prstGeom>
-          <a:noFill/>
-          <a:ln>
-            <a:noFill/>
-          </a:ln>
-        </p:spPr>
-        <p:txBody>
-          <a:bodyPr wrap="none" rtlCol="0">
-            <a:spAutoFit/>
-          </a:bodyPr>
-          <a:lstStyle/>
-          <a:p>
-            <a:r>
-              <a:rPr lang="en-US" sz="1400" dirty="0">
-                <a:solidFill>
-                  <a:srgbClr val="7030A0"/>
-                </a:solidFill>
-              </a:rPr>
-              <a:t>Channel B</a:t>
-            </a:r>
-          </a:p>
-        </p:txBody>
-      </p:sp>
-      <p:sp>
-        <p:nvSpPr>
-          <p:cNvPr id="47" name="Rectangle 46">
-            <a:extLst>
-              <a:ext uri="{FF2B5EF4-FFF2-40B4-BE49-F238E27FC236}">
-                <a16:creationId xmlns:a16="http://schemas.microsoft.com/office/drawing/2014/main" id="{2819212F-690B-806B-DF99-D5EC81894B5C}"/>
-              </a:ext>
-            </a:extLst>
-          </p:cNvPr>
-          <p:cNvSpPr/>
-          <p:nvPr/>
-        </p:nvSpPr>
-        <p:spPr>
-          <a:xfrm>
-            <a:off x="2828602" y="2795115"/>
-            <a:ext cx="1289583" cy="1289583"/>
-          </a:xfrm>
-          <a:prstGeom prst="rect">
-            <a:avLst/>
-          </a:prstGeom>
-        </p:spPr>
-        <p:style>
-          <a:lnRef idx="2">
-            <a:schemeClr val="accent1">
-              <a:shade val="15000"/>
-            </a:schemeClr>
-          </a:lnRef>
-          <a:fillRef idx="1">
-            <a:schemeClr val="accent1"/>
-          </a:fillRef>
-          <a:effectRef idx="0">
-            <a:schemeClr val="accent1"/>
-          </a:effectRef>
-          <a:fontRef idx="minor">
-            <a:schemeClr val="lt1"/>
-          </a:fontRef>
-        </p:style>
-        <p:txBody>
-          <a:bodyPr rtlCol="0" anchor="ctr"/>
-          <a:lstStyle/>
-          <a:p>
-            <a:pPr algn="ctr"/>
-            <a:r>
-              <a:rPr lang="en-US" dirty="0"/>
-              <a:t>Word Generation Flight Software</a:t>
-            </a:r>
-          </a:p>
-        </p:txBody>
-      </p:sp>
-      <p:graphicFrame>
-        <p:nvGraphicFramePr>
-          <p:cNvPr id="48" name="Table 47">
-            <a:extLst>
-              <a:ext uri="{FF2B5EF4-FFF2-40B4-BE49-F238E27FC236}">
-                <a16:creationId xmlns:a16="http://schemas.microsoft.com/office/drawing/2014/main" id="{DC46FFF6-18EE-84B5-15A6-A3994ACD62FC}"/>
-              </a:ext>
-            </a:extLst>
-          </p:cNvPr>
-          <p:cNvGraphicFramePr>
-            <a:graphicFrameLocks noGrp="1"/>
-          </p:cNvGraphicFramePr>
-          <p:nvPr>
-            <p:extLst>
-              <p:ext uri="{D42A27DB-BD31-4B8C-83A1-F6EECF244321}">
-                <p14:modId xmlns:p14="http://schemas.microsoft.com/office/powerpoint/2010/main" val="4254477071"/>
-              </p:ext>
-            </p:extLst>
-          </p:nvPr>
-        </p:nvGraphicFramePr>
-        <p:xfrm>
-          <a:off x="4485518" y="951221"/>
-          <a:ext cx="1340585" cy="2194560"/>
-        </p:xfrm>
-        <a:graphic>
-          <a:graphicData uri="http://schemas.openxmlformats.org/drawingml/2006/table">
-            <a:tbl>
-              <a:tblPr firstRow="1" bandRow="1">
-                <a:tableStyleId>{5C22544A-7EE6-4342-B048-85BDC9FD1C3A}</a:tableStyleId>
-              </a:tblPr>
-              <a:tblGrid>
-                <a:gridCol w="1340585">
-                  <a:extLst>
-                    <a:ext uri="{9D8B030D-6E8A-4147-A177-3AD203B41FA5}">
-                      <a16:colId xmlns:a16="http://schemas.microsoft.com/office/drawing/2014/main" val="2743252670"/>
-                    </a:ext>
-                  </a:extLst>
-                </a:gridCol>
-              </a:tblGrid>
-              <a:tr h="214487">
-                <a:tc>
-                  <a:txBody>
-                    <a:bodyPr/>
-                    <a:lstStyle/>
-                    <a:p>
-                      <a:pPr algn="ctr"/>
-                      <a:r>
-                        <a:rPr lang="en-US" dirty="0"/>
-                        <a:t>FIFO</a:t>
-                      </a:r>
-                    </a:p>
-                  </a:txBody>
-                  <a:tcPr/>
-                </a:tc>
-                <a:extLst>
-                  <a:ext uri="{0D108BD9-81ED-4DB2-BD59-A6C34878D82A}">
-                    <a16:rowId xmlns:a16="http://schemas.microsoft.com/office/drawing/2014/main" val="2856338901"/>
-                  </a:ext>
-                </a:extLst>
-              </a:tr>
-              <a:tr h="214487">
-                <a:tc>
-                  <a:txBody>
-                    <a:bodyPr/>
-                    <a:lstStyle/>
-                    <a:p>
-                      <a:r>
-                        <a:rPr lang="en-US" dirty="0"/>
-                        <a:t>WORD1</a:t>
-                      </a:r>
-                    </a:p>
-                  </a:txBody>
-                  <a:tcPr/>
-                </a:tc>
-                <a:extLst>
-                  <a:ext uri="{0D108BD9-81ED-4DB2-BD59-A6C34878D82A}">
-                    <a16:rowId xmlns:a16="http://schemas.microsoft.com/office/drawing/2014/main" val="3926682255"/>
-                  </a:ext>
-                </a:extLst>
-              </a:tr>
-              <a:tr h="214487">
-                <a:tc>
-                  <a:txBody>
-                    <a:bodyPr/>
-                    <a:lstStyle/>
-                    <a:p>
-                      <a:r>
-                        <a:rPr lang="en-US" dirty="0"/>
-                        <a:t>WORD2</a:t>
-                      </a:r>
-                    </a:p>
-                  </a:txBody>
-                  <a:tcPr/>
-                </a:tc>
-                <a:extLst>
-                  <a:ext uri="{0D108BD9-81ED-4DB2-BD59-A6C34878D82A}">
-                    <a16:rowId xmlns:a16="http://schemas.microsoft.com/office/drawing/2014/main" val="673934916"/>
-                  </a:ext>
-                </a:extLst>
-              </a:tr>
-              <a:tr h="214487">
-                <a:tc>
-                  <a:txBody>
-                    <a:bodyPr/>
-                    <a:lstStyle/>
-                    <a:p>
-                      <a:r>
-                        <a:rPr lang="en-US" dirty="0"/>
-                        <a:t>WORD3</a:t>
-                      </a:r>
-                    </a:p>
-                  </a:txBody>
-                  <a:tcPr/>
-                </a:tc>
-                <a:extLst>
-                  <a:ext uri="{0D108BD9-81ED-4DB2-BD59-A6C34878D82A}">
-                    <a16:rowId xmlns:a16="http://schemas.microsoft.com/office/drawing/2014/main" val="3421250104"/>
-                  </a:ext>
-                </a:extLst>
-              </a:tr>
-              <a:tr h="214487">
-                <a:tc>
-                  <a:txBody>
-                    <a:bodyPr/>
-                    <a:lstStyle/>
-                    <a:p>
-                      <a:r>
-                        <a:rPr lang="en-US" dirty="0"/>
-                        <a:t>WORD4</a:t>
-                      </a:r>
-                    </a:p>
-                  </a:txBody>
-                  <a:tcPr/>
-                </a:tc>
-                <a:extLst>
-                  <a:ext uri="{0D108BD9-81ED-4DB2-BD59-A6C34878D82A}">
-                    <a16:rowId xmlns:a16="http://schemas.microsoft.com/office/drawing/2014/main" val="3972317163"/>
-                  </a:ext>
-                </a:extLst>
-              </a:tr>
-              <a:tr h="214487">
-                <a:tc>
-                  <a:txBody>
-                    <a:bodyPr/>
-                    <a:lstStyle/>
-                    <a:p>
-                      <a:r>
-                        <a:rPr lang="en-US" dirty="0"/>
-                        <a:t>WORD5</a:t>
-                      </a:r>
-                    </a:p>
-                  </a:txBody>
-                  <a:tcPr/>
-                </a:tc>
-                <a:extLst>
-                  <a:ext uri="{0D108BD9-81ED-4DB2-BD59-A6C34878D82A}">
-                    <a16:rowId xmlns:a16="http://schemas.microsoft.com/office/drawing/2014/main" val="2957364362"/>
-                  </a:ext>
-                </a:extLst>
-              </a:tr>
-            </a:tbl>
-          </a:graphicData>
-        </a:graphic>
-      </p:graphicFrame>
+            <a:r>
+              <a:rPr lang="en-US" sz="1100" dirty="0"/>
+              <a:t>ADIRU</a:t>
+            </a:r>
+          </a:p>
+        </p:txBody>
+      </p:sp>
       <p:cxnSp>
         <p:nvCxnSpPr>
-          <p:cNvPr id="51" name="Connector: Elbow 50">
-            <a:extLst>
-              <a:ext uri="{FF2B5EF4-FFF2-40B4-BE49-F238E27FC236}">
-                <a16:creationId xmlns:a16="http://schemas.microsoft.com/office/drawing/2014/main" id="{768703E4-A2D2-C2ED-5FA2-7E5184EEBD4F}"/>
+          <p:cNvPr id="81" name="Straight Arrow Connector 80">
+            <a:extLst>
+              <a:ext uri="{FF2B5EF4-FFF2-40B4-BE49-F238E27FC236}">
+                <a16:creationId xmlns:a16="http://schemas.microsoft.com/office/drawing/2014/main" id="{50066EE9-2CA8-04E5-CE9C-D60CBCD5FA1E}"/>
               </a:ext>
             </a:extLst>
           </p:cNvPr>
           <p:cNvCxnSpPr>
             <a:cxnSpLocks/>
-            <a:stCxn id="47" idx="3"/>
-            <a:endCxn id="55" idx="1"/>
+            <a:stCxn id="79" idx="0"/>
           </p:cNvCxnSpPr>
           <p:nvPr/>
         </p:nvCxnSpPr>
         <p:spPr>
-          <a:xfrm flipV="1">
-            <a:off x="4118185" y="1502828"/>
-            <a:ext cx="195552" cy="1937079"/>
-          </a:xfrm>
-          <a:prstGeom prst="bentConnector3">
-            <a:avLst>
-              <a:gd name="adj1" fmla="val 50000"/>
-            </a:avLst>
+          <a:xfrm flipH="1" flipV="1">
+            <a:off x="2894124" y="4668639"/>
+            <a:ext cx="1" cy="979083"/>
+          </a:xfrm>
+          <a:prstGeom prst="straightConnector1">
+            <a:avLst/>
           </a:prstGeom>
-          <a:ln>
+          <a:ln w="57150">
+            <a:solidFill>
+              <a:srgbClr val="00B0F0"/>
+            </a:solidFill>
+            <a:prstDash val="sysDash"/>
             <a:tailEnd type="triangle"/>
           </a:ln>
         </p:spPr>
@@ -4433,120 +3893,131 @@
       </p:cxnSp>
       <p:sp>
         <p:nvSpPr>
-          <p:cNvPr id="55" name="Rectangle 54">
-            <a:extLst>
-              <a:ext uri="{FF2B5EF4-FFF2-40B4-BE49-F238E27FC236}">
-                <a16:creationId xmlns:a16="http://schemas.microsoft.com/office/drawing/2014/main" id="{7D3BB3F9-B34D-B85F-C7D6-BFCBD85EBFC4}"/>
-              </a:ext>
-            </a:extLst>
-          </p:cNvPr>
-          <p:cNvSpPr/>
+          <p:cNvPr id="3" name="TextBox 2">
+            <a:extLst>
+              <a:ext uri="{FF2B5EF4-FFF2-40B4-BE49-F238E27FC236}">
+                <a16:creationId xmlns:a16="http://schemas.microsoft.com/office/drawing/2014/main" id="{817C8C35-081A-35B8-B660-166E286A703D}"/>
+              </a:ext>
+            </a:extLst>
+          </p:cNvPr>
+          <p:cNvSpPr txBox="1"/>
           <p:nvPr/>
         </p:nvSpPr>
         <p:spPr>
           <a:xfrm>
-            <a:off x="4313737" y="1342284"/>
-            <a:ext cx="171784" cy="321087"/>
+            <a:off x="309386" y="819771"/>
+            <a:ext cx="5438271" cy="1477328"/>
           </a:xfrm>
           <a:prstGeom prst="rect">
             <a:avLst/>
           </a:prstGeom>
-        </p:spPr>
-        <p:style>
-          <a:lnRef idx="2">
-            <a:schemeClr val="accent1">
-              <a:shade val="15000"/>
-            </a:schemeClr>
-          </a:lnRef>
-          <a:fillRef idx="1">
-            <a:schemeClr val="accent1"/>
-          </a:fillRef>
-          <a:effectRef idx="0">
-            <a:schemeClr val="accent1"/>
-          </a:effectRef>
-          <a:fontRef idx="minor">
-            <a:schemeClr val="lt1"/>
-          </a:fontRef>
-        </p:style>
-        <p:txBody>
-          <a:bodyPr rtlCol="0" anchor="ctr"/>
-          <a:lstStyle/>
-          <a:p>
-            <a:pPr algn="ctr"/>
-            <a:endParaRPr lang="en-US"/>
-          </a:p>
-        </p:txBody>
-      </p:sp>
-      <p:sp>
-        <p:nvSpPr>
-          <p:cNvPr id="59" name="Rectangle 58">
-            <a:extLst>
-              <a:ext uri="{FF2B5EF4-FFF2-40B4-BE49-F238E27FC236}">
-                <a16:creationId xmlns:a16="http://schemas.microsoft.com/office/drawing/2014/main" id="{8B58B900-0509-0DB8-BF8C-14C11C2B46FF}"/>
-              </a:ext>
-            </a:extLst>
-          </p:cNvPr>
-          <p:cNvSpPr/>
-          <p:nvPr/>
-        </p:nvSpPr>
-        <p:spPr>
-          <a:xfrm>
-            <a:off x="5812406" y="2789794"/>
-            <a:ext cx="171784" cy="321087"/>
-          </a:xfrm>
-          <a:prstGeom prst="rect">
-            <a:avLst/>
-          </a:prstGeom>
-        </p:spPr>
-        <p:style>
-          <a:lnRef idx="2">
-            <a:schemeClr val="accent1">
-              <a:shade val="15000"/>
-            </a:schemeClr>
-          </a:lnRef>
-          <a:fillRef idx="1">
-            <a:schemeClr val="accent1"/>
-          </a:fillRef>
-          <a:effectRef idx="0">
-            <a:schemeClr val="accent1"/>
-          </a:effectRef>
-          <a:fontRef idx="minor">
-            <a:schemeClr val="lt1"/>
-          </a:fontRef>
-        </p:style>
-        <p:txBody>
-          <a:bodyPr rtlCol="0" anchor="ctr"/>
-          <a:lstStyle/>
-          <a:p>
-            <a:pPr algn="ctr"/>
-            <a:endParaRPr lang="en-US"/>
+          <a:noFill/>
+        </p:spPr>
+        <p:txBody>
+          <a:bodyPr wrap="square" rtlCol="0">
+            <a:spAutoFit/>
+          </a:bodyPr>
+          <a:lstStyle/>
+          <a:p>
+            <a:r>
+              <a:rPr lang="en-US" dirty="0"/>
+              <a:t>Pseudocode Idea:</a:t>
+            </a:r>
+          </a:p>
+          <a:p>
+            <a:r>
+              <a:rPr lang="en-US" dirty="0">
+                <a:latin typeface="Courier New" panose="02070309020205020404" pitchFamily="49" charset="0"/>
+                <a:cs typeface="Courier New" panose="02070309020205020404" pitchFamily="49" charset="0"/>
+              </a:rPr>
+              <a:t>if(</a:t>
+            </a:r>
+            <a:r>
+              <a:rPr lang="en-US" dirty="0" err="1">
+                <a:latin typeface="Courier New" panose="02070309020205020404" pitchFamily="49" charset="0"/>
+                <a:cs typeface="Courier New" panose="02070309020205020404" pitchFamily="49" charset="0"/>
+              </a:rPr>
+              <a:t>lat</a:t>
+            </a:r>
+            <a:r>
+              <a:rPr lang="en-US" dirty="0">
+                <a:latin typeface="Courier New" panose="02070309020205020404" pitchFamily="49" charset="0"/>
+                <a:cs typeface="Courier New" panose="02070309020205020404" pitchFamily="49" charset="0"/>
+              </a:rPr>
+              <a:t>, long in Friendly Airspace):</a:t>
+            </a:r>
+          </a:p>
+          <a:p>
+            <a:r>
+              <a:rPr lang="en-US" dirty="0">
+                <a:latin typeface="Courier New" panose="02070309020205020404" pitchFamily="49" charset="0"/>
+                <a:cs typeface="Courier New" panose="02070309020205020404" pitchFamily="49" charset="0"/>
+              </a:rPr>
+              <a:t>	for x in range(2):</a:t>
+            </a:r>
+          </a:p>
+          <a:p>
+            <a:r>
+              <a:rPr lang="en-US" dirty="0">
+                <a:latin typeface="Courier New" panose="02070309020205020404" pitchFamily="49" charset="0"/>
+                <a:cs typeface="Courier New" panose="02070309020205020404" pitchFamily="49" charset="0"/>
+              </a:rPr>
+              <a:t>		sleep(15 min)</a:t>
+            </a:r>
+          </a:p>
+          <a:p>
+            <a:r>
+              <a:rPr lang="en-US" dirty="0">
+                <a:latin typeface="Courier New" panose="02070309020205020404" pitchFamily="49" charset="0"/>
+                <a:cs typeface="Courier New" panose="02070309020205020404" pitchFamily="49" charset="0"/>
+              </a:rPr>
+              <a:t>		send(</a:t>
+            </a:r>
+            <a:r>
+              <a:rPr lang="en-US" dirty="0" err="1">
+                <a:latin typeface="Courier New" panose="02070309020205020404" pitchFamily="49" charset="0"/>
+                <a:cs typeface="Courier New" panose="02070309020205020404" pitchFamily="49" charset="0"/>
+              </a:rPr>
+              <a:t>AoA</a:t>
+            </a:r>
+            <a:r>
+              <a:rPr lang="en-US" dirty="0">
+                <a:latin typeface="Courier New" panose="02070309020205020404" pitchFamily="49" charset="0"/>
+                <a:cs typeface="Courier New" panose="02070309020205020404" pitchFamily="49" charset="0"/>
+              </a:rPr>
+              <a:t>=-70 deg word)</a:t>
+            </a:r>
           </a:p>
         </p:txBody>
       </p:sp>
       <p:cxnSp>
         <p:nvCxnSpPr>
-          <p:cNvPr id="61" name="Connector: Elbow 60">
-            <a:extLst>
-              <a:ext uri="{FF2B5EF4-FFF2-40B4-BE49-F238E27FC236}">
-                <a16:creationId xmlns:a16="http://schemas.microsoft.com/office/drawing/2014/main" id="{ED42D6CE-D8BB-4AEB-CB1F-05286085EACE}"/>
+          <p:cNvPr id="4" name="Straight Arrow Connector 3">
+            <a:extLst>
+              <a:ext uri="{FF2B5EF4-FFF2-40B4-BE49-F238E27FC236}">
+                <a16:creationId xmlns:a16="http://schemas.microsoft.com/office/drawing/2014/main" id="{F115D77D-908D-4549-52E1-9D7F07CC8B8B}"/>
               </a:ext>
             </a:extLst>
           </p:cNvPr>
           <p:cNvCxnSpPr>
-            <a:stCxn id="59" idx="3"/>
-            <a:endCxn id="10" idx="1"/>
+            <a:cxnSpLocks/>
+            <a:stCxn id="3" idx="2"/>
           </p:cNvCxnSpPr>
           <p:nvPr/>
         </p:nvCxnSpPr>
         <p:spPr>
           <a:xfrm>
-            <a:off x="5984190" y="2950338"/>
-            <a:ext cx="256065" cy="478662"/>
-          </a:xfrm>
-          <a:prstGeom prst="bentConnector3">
+            <a:off x="3028522" y="2297099"/>
+            <a:ext cx="0" cy="624231"/>
+          </a:xfrm>
+          <a:prstGeom prst="straightConnector1">
             <a:avLst/>
           </a:prstGeom>
-          <a:ln>
+          <a:ln w="57150">
+            <a:solidFill>
+              <a:srgbClr val="00B0F0"/>
+            </a:solidFill>
+            <a:prstDash val="sysDash"/>
             <a:tailEnd type="triangle"/>
           </a:ln>
         </p:spPr>
@@ -4567,10 +4038,10 @@
       </p:cxnSp>
       <p:sp>
         <p:nvSpPr>
-          <p:cNvPr id="62" name="TextBox 61">
-            <a:extLst>
-              <a:ext uri="{FF2B5EF4-FFF2-40B4-BE49-F238E27FC236}">
-                <a16:creationId xmlns:a16="http://schemas.microsoft.com/office/drawing/2014/main" id="{19171710-6167-3644-348A-87490D8CAE38}"/>
+          <p:cNvPr id="7" name="TextBox 6">
+            <a:extLst>
+              <a:ext uri="{FF2B5EF4-FFF2-40B4-BE49-F238E27FC236}">
+                <a16:creationId xmlns:a16="http://schemas.microsoft.com/office/drawing/2014/main" id="{B299781E-EF7A-5596-99B7-027BA93B5404}"/>
               </a:ext>
             </a:extLst>
           </p:cNvPr>
@@ -4579,8 +4050,8 @@
         </p:nvSpPr>
         <p:spPr>
           <a:xfrm>
-            <a:off x="3914928" y="280111"/>
-            <a:ext cx="2481769" cy="600164"/>
+            <a:off x="166882" y="2909034"/>
+            <a:ext cx="5438271" cy="646331"/>
           </a:xfrm>
           <a:prstGeom prst="rect">
             <a:avLst/>
@@ -4588,234 +4059,172 @@
           <a:noFill/>
         </p:spPr>
         <p:txBody>
-          <a:bodyPr wrap="none" rtlCol="0">
+          <a:bodyPr wrap="square" rtlCol="0">
             <a:spAutoFit/>
           </a:bodyPr>
           <a:lstStyle/>
           <a:p>
             <a:pPr algn="ctr"/>
             <a:r>
-              <a:rPr lang="en-US" sz="1100" dirty="0"/>
-              <a:t>Scheduled Mode (every x </a:t>
-            </a:r>
-            <a:r>
-              <a:rPr lang="en-US" sz="1100" dirty="0" err="1"/>
-              <a:t>usec</a:t>
-            </a:r>
-            <a:r>
-              <a:rPr lang="en-US" sz="1100" dirty="0"/>
-              <a:t>)</a:t>
-            </a:r>
-          </a:p>
-          <a:p>
-            <a:pPr algn="ctr"/>
-            <a:r>
-              <a:rPr lang="en-US" sz="1100" dirty="0"/>
-              <a:t>vs</a:t>
-            </a:r>
-          </a:p>
-          <a:p>
-            <a:pPr algn="ctr"/>
-            <a:r>
-              <a:rPr lang="en-US" sz="1100" dirty="0"/>
-              <a:t>Software Defined Mode (non-uniform)</a:t>
-            </a:r>
-          </a:p>
-        </p:txBody>
-      </p:sp>
-      <p:sp>
-        <p:nvSpPr>
-          <p:cNvPr id="64" name="Rectangle: Rounded Corners 63">
-            <a:extLst>
-              <a:ext uri="{FF2B5EF4-FFF2-40B4-BE49-F238E27FC236}">
-                <a16:creationId xmlns:a16="http://schemas.microsoft.com/office/drawing/2014/main" id="{B913AE93-563A-0603-FE77-16A31D240077}"/>
-              </a:ext>
-            </a:extLst>
-          </p:cNvPr>
-          <p:cNvSpPr/>
+              <a:rPr lang="en-US" dirty="0"/>
+              <a:t>(emulates Qantas Flight 72 – causing piolets to declare mayday and do an emergency landing)</a:t>
+            </a:r>
+          </a:p>
+        </p:txBody>
+      </p:sp>
+      <p:pic>
+        <p:nvPicPr>
+          <p:cNvPr id="2050" name="Picture 2" descr="Qantas Flight 72 - Wikipedia">
+            <a:extLst>
+              <a:ext uri="{FF2B5EF4-FFF2-40B4-BE49-F238E27FC236}">
+                <a16:creationId xmlns:a16="http://schemas.microsoft.com/office/drawing/2014/main" id="{49093C3F-363B-4560-F311-991E33500EED}"/>
+              </a:ext>
+            </a:extLst>
+          </p:cNvPr>
+          <p:cNvPicPr>
+            <a:picLocks noChangeAspect="1" noChangeArrowheads="1"/>
+          </p:cNvPicPr>
           <p:nvPr/>
-        </p:nvSpPr>
-        <p:spPr>
-          <a:xfrm>
-            <a:off x="4586928" y="4026966"/>
-            <a:ext cx="1137765" cy="1129040"/>
-          </a:xfrm>
-          <a:prstGeom prst="roundRect">
+        </p:nvPicPr>
+        <p:blipFill>
+          <a:blip r:embed="rId2">
+            <a:extLst>
+              <a:ext uri="{28A0092B-C50C-407E-A947-70E740481C1C}">
+                <a14:useLocalDpi xmlns:a14="http://schemas.microsoft.com/office/drawing/2010/main" val="0"/>
+              </a:ext>
+            </a:extLst>
+          </a:blip>
+          <a:srcRect/>
+          <a:stretch>
+            <a:fillRect/>
+          </a:stretch>
+        </p:blipFill>
+        <p:spPr bwMode="auto">
+          <a:xfrm>
+            <a:off x="982161" y="3548290"/>
+            <a:ext cx="1777567" cy="1182890"/>
+          </a:xfrm>
+          <a:prstGeom prst="rect">
             <a:avLst/>
           </a:prstGeom>
-        </p:spPr>
-        <p:style>
-          <a:lnRef idx="2">
-            <a:schemeClr val="accent1">
-              <a:shade val="15000"/>
-            </a:schemeClr>
-          </a:lnRef>
-          <a:fillRef idx="1">
-            <a:schemeClr val="accent1"/>
-          </a:fillRef>
-          <a:effectRef idx="0">
-            <a:schemeClr val="accent1"/>
-          </a:effectRef>
-          <a:fontRef idx="minor">
-            <a:schemeClr val="lt1"/>
-          </a:fontRef>
-        </p:style>
-        <p:txBody>
-          <a:bodyPr rtlCol="0" anchor="ctr"/>
-          <a:lstStyle/>
-          <a:p>
-            <a:pPr algn="ctr"/>
-            <a:r>
-              <a:rPr lang="en-US" sz="1200" dirty="0"/>
-              <a:t>Advanced Scheduler (i.e. Decision Tree)</a:t>
-            </a:r>
-          </a:p>
-        </p:txBody>
-      </p:sp>
-      <p:graphicFrame>
-        <p:nvGraphicFramePr>
-          <p:cNvPr id="66" name="Table 65">
-            <a:extLst>
-              <a:ext uri="{FF2B5EF4-FFF2-40B4-BE49-F238E27FC236}">
-                <a16:creationId xmlns:a16="http://schemas.microsoft.com/office/drawing/2014/main" id="{FE706104-4682-7260-3F7E-2844330C977F}"/>
-              </a:ext>
-            </a:extLst>
-          </p:cNvPr>
-          <p:cNvGraphicFramePr>
-            <a:graphicFrameLocks noGrp="1"/>
-          </p:cNvGraphicFramePr>
-          <p:nvPr>
-            <p:extLst>
-              <p:ext uri="{D42A27DB-BD31-4B8C-83A1-F6EECF244321}">
-                <p14:modId xmlns:p14="http://schemas.microsoft.com/office/powerpoint/2010/main" val="1792695439"/>
-              </p:ext>
-            </p:extLst>
-          </p:nvPr>
-        </p:nvGraphicFramePr>
-        <p:xfrm>
-          <a:off x="4375780" y="5162986"/>
-          <a:ext cx="1560061" cy="853440"/>
-        </p:xfrm>
-        <a:graphic>
-          <a:graphicData uri="http://schemas.openxmlformats.org/drawingml/2006/table">
-            <a:tbl>
-              <a:tblPr firstRow="1" bandRow="1">
-                <a:tableStyleId>{5C22544A-7EE6-4342-B048-85BDC9FD1C3A}</a:tableStyleId>
-              </a:tblPr>
-              <a:tblGrid>
-                <a:gridCol w="1560061">
-                  <a:extLst>
-                    <a:ext uri="{9D8B030D-6E8A-4147-A177-3AD203B41FA5}">
-                      <a16:colId xmlns:a16="http://schemas.microsoft.com/office/drawing/2014/main" val="3724874686"/>
-                    </a:ext>
-                  </a:extLst>
-                </a:gridCol>
-              </a:tblGrid>
-              <a:tr h="370840">
-                <a:tc>
-                  <a:txBody>
-                    <a:bodyPr/>
-                    <a:lstStyle/>
-                    <a:p>
-                      <a:pPr marL="0" marR="0" lvl="0" indent="0" algn="ctr" defTabSz="914400" rtl="0" eaLnBrk="1" fontAlgn="auto" latinLnBrk="0" hangingPunct="1">
-                        <a:lnSpc>
-                          <a:spcPct val="100000"/>
-                        </a:lnSpc>
-                        <a:spcBef>
-                          <a:spcPts val="0"/>
-                        </a:spcBef>
-                        <a:spcAft>
-                          <a:spcPts val="0"/>
-                        </a:spcAft>
-                        <a:buClrTx/>
-                        <a:buSzTx/>
-                        <a:buFontTx/>
-                        <a:buNone/>
-                        <a:tabLst/>
-                        <a:defRPr/>
-                      </a:pPr>
-                      <a:r>
-                        <a:rPr lang="en-US" sz="1100" b="0" dirty="0"/>
-                        <a:t>WORD1 -&gt; send on condition X</a:t>
-                      </a:r>
-                    </a:p>
-                  </a:txBody>
-                  <a:tcPr/>
-                </a:tc>
-                <a:extLst>
-                  <a:ext uri="{0D108BD9-81ED-4DB2-BD59-A6C34878D82A}">
-                    <a16:rowId xmlns:a16="http://schemas.microsoft.com/office/drawing/2014/main" val="1041761766"/>
-                  </a:ext>
-                </a:extLst>
-              </a:tr>
-              <a:tr h="370840">
-                <a:tc>
-                  <a:txBody>
-                    <a:bodyPr/>
-                    <a:lstStyle/>
-                    <a:p>
-                      <a:pPr marL="0" marR="0" lvl="0" indent="0" algn="ctr" defTabSz="914400" rtl="0" eaLnBrk="1" fontAlgn="auto" latinLnBrk="0" hangingPunct="1">
-                        <a:lnSpc>
-                          <a:spcPct val="100000"/>
-                        </a:lnSpc>
-                        <a:spcBef>
-                          <a:spcPts val="0"/>
-                        </a:spcBef>
-                        <a:spcAft>
-                          <a:spcPts val="0"/>
-                        </a:spcAft>
-                        <a:buClrTx/>
-                        <a:buSzTx/>
-                        <a:buFontTx/>
-                        <a:buNone/>
-                        <a:tabLst/>
-                        <a:defRPr/>
-                      </a:pPr>
-                      <a:r>
-                        <a:rPr lang="en-US" sz="1100" b="0" dirty="0"/>
-                        <a:t>WORD2 -&gt; send on condition Y</a:t>
-                      </a:r>
-                    </a:p>
-                  </a:txBody>
-                  <a:tcPr/>
-                </a:tc>
-                <a:extLst>
-                  <a:ext uri="{0D108BD9-81ED-4DB2-BD59-A6C34878D82A}">
-                    <a16:rowId xmlns:a16="http://schemas.microsoft.com/office/drawing/2014/main" val="1774340586"/>
-                  </a:ext>
-                </a:extLst>
-              </a:tr>
-            </a:tbl>
-          </a:graphicData>
-        </a:graphic>
-      </p:graphicFrame>
+          <a:noFill/>
+          <a:extLst>
+            <a:ext uri="{909E8E84-426E-40DD-AFC4-6F175D3DCCD1}">
+              <a14:hiddenFill xmlns:a14="http://schemas.microsoft.com/office/drawing/2010/main">
+                <a:solidFill>
+                  <a:srgbClr val="FFFFFF"/>
+                </a:solidFill>
+              </a14:hiddenFill>
+            </a:ext>
+          </a:extLst>
+        </p:spPr>
+      </p:pic>
+      <p:pic>
+        <p:nvPicPr>
+          <p:cNvPr id="2056" name="Picture 8">
+            <a:extLst>
+              <a:ext uri="{FF2B5EF4-FFF2-40B4-BE49-F238E27FC236}">
+                <a16:creationId xmlns:a16="http://schemas.microsoft.com/office/drawing/2014/main" id="{F718757E-3839-93CC-F9A5-12966A4C8F3D}"/>
+              </a:ext>
+            </a:extLst>
+          </p:cNvPr>
+          <p:cNvPicPr>
+            <a:picLocks noChangeAspect="1" noChangeArrowheads="1"/>
+          </p:cNvPicPr>
+          <p:nvPr/>
+        </p:nvPicPr>
+        <p:blipFill>
+          <a:blip r:embed="rId3">
+            <a:extLst>
+              <a:ext uri="{28A0092B-C50C-407E-A947-70E740481C1C}">
+                <a14:useLocalDpi xmlns:a14="http://schemas.microsoft.com/office/drawing/2010/main" val="0"/>
+              </a:ext>
+            </a:extLst>
+          </a:blip>
+          <a:srcRect/>
+          <a:stretch>
+            <a:fillRect/>
+          </a:stretch>
+        </p:blipFill>
+        <p:spPr bwMode="auto">
+          <a:xfrm>
+            <a:off x="3028521" y="3593219"/>
+            <a:ext cx="1628207" cy="1107181"/>
+          </a:xfrm>
+          <a:prstGeom prst="rect">
+            <a:avLst/>
+          </a:prstGeom>
+          <a:noFill/>
+          <a:extLst>
+            <a:ext uri="{909E8E84-426E-40DD-AFC4-6F175D3DCCD1}">
+              <a14:hiddenFill xmlns:a14="http://schemas.microsoft.com/office/drawing/2010/main">
+                <a:solidFill>
+                  <a:srgbClr val="FFFFFF"/>
+                </a:solidFill>
+              </a14:hiddenFill>
+            </a:ext>
+          </a:extLst>
+        </p:spPr>
+      </p:pic>
+      <p:pic>
+        <p:nvPicPr>
+          <p:cNvPr id="12" name="Picture 11">
+            <a:extLst>
+              <a:ext uri="{FF2B5EF4-FFF2-40B4-BE49-F238E27FC236}">
+                <a16:creationId xmlns:a16="http://schemas.microsoft.com/office/drawing/2014/main" id="{CA8064D6-69DF-8971-BCD0-8A0B516C7082}"/>
+              </a:ext>
+            </a:extLst>
+          </p:cNvPr>
+          <p:cNvPicPr>
+            <a:picLocks noChangeAspect="1"/>
+          </p:cNvPicPr>
+          <p:nvPr/>
+        </p:nvPicPr>
+        <p:blipFill>
+          <a:blip r:embed="rId4"/>
+          <a:stretch>
+            <a:fillRect/>
+          </a:stretch>
+        </p:blipFill>
+        <p:spPr>
+          <a:xfrm>
+            <a:off x="6658053" y="434328"/>
+            <a:ext cx="2505425" cy="2248214"/>
+          </a:xfrm>
+          <a:prstGeom prst="rect">
+            <a:avLst/>
+          </a:prstGeom>
+        </p:spPr>
+      </p:pic>
       <p:cxnSp>
         <p:nvCxnSpPr>
-          <p:cNvPr id="67" name="Connector: Elbow 66">
-            <a:extLst>
-              <a:ext uri="{FF2B5EF4-FFF2-40B4-BE49-F238E27FC236}">
-                <a16:creationId xmlns:a16="http://schemas.microsoft.com/office/drawing/2014/main" id="{2371A570-C89B-CEA4-A554-6E5F2D93B0D8}"/>
+          <p:cNvPr id="13" name="Straight Arrow Connector 12">
+            <a:extLst>
+              <a:ext uri="{FF2B5EF4-FFF2-40B4-BE49-F238E27FC236}">
+                <a16:creationId xmlns:a16="http://schemas.microsoft.com/office/drawing/2014/main" id="{840CAF11-8975-2170-119F-7E1C9EDABFE7}"/>
               </a:ext>
             </a:extLst>
           </p:cNvPr>
           <p:cNvCxnSpPr>
             <a:cxnSpLocks/>
-            <a:stCxn id="47" idx="3"/>
-            <a:endCxn id="64" idx="1"/>
+            <a:stCxn id="3" idx="3"/>
+            <a:endCxn id="12" idx="1"/>
           </p:cNvCxnSpPr>
           <p:nvPr/>
         </p:nvCxnSpPr>
         <p:spPr>
           <a:xfrm>
-            <a:off x="4118185" y="3439907"/>
-            <a:ext cx="468743" cy="1151579"/>
-          </a:xfrm>
-          <a:prstGeom prst="bentConnector3">
-            <a:avLst>
-              <a:gd name="adj1" fmla="val 21044"/>
-            </a:avLst>
+            <a:off x="5747657" y="1558435"/>
+            <a:ext cx="910396" cy="0"/>
+          </a:xfrm>
+          <a:prstGeom prst="straightConnector1">
+            <a:avLst/>
           </a:prstGeom>
-          <a:ln>
+          <a:ln w="57150">
+            <a:solidFill>
+              <a:srgbClr val="00B0F0"/>
+            </a:solidFill>
+            <a:prstDash val="sysDash"/>
             <a:tailEnd type="triangle"/>
           </a:ln>
         </p:spPr>
@@ -4834,33 +4243,176 @@
           </a:fontRef>
         </p:style>
       </p:cxnSp>
+      <p:sp>
+        <p:nvSpPr>
+          <p:cNvPr id="18" name="TextBox 17">
+            <a:extLst>
+              <a:ext uri="{FF2B5EF4-FFF2-40B4-BE49-F238E27FC236}">
+                <a16:creationId xmlns:a16="http://schemas.microsoft.com/office/drawing/2014/main" id="{1E8560D8-3EA5-1BC3-0DD4-34137525390D}"/>
+              </a:ext>
+            </a:extLst>
+          </p:cNvPr>
+          <p:cNvSpPr txBox="1"/>
+          <p:nvPr/>
+        </p:nvSpPr>
+        <p:spPr>
+          <a:xfrm>
+            <a:off x="9141113" y="579352"/>
+            <a:ext cx="2849764" cy="646331"/>
+          </a:xfrm>
+          <a:prstGeom prst="rect">
+            <a:avLst/>
+          </a:prstGeom>
+          <a:noFill/>
+        </p:spPr>
+        <p:txBody>
+          <a:bodyPr wrap="square" rtlCol="0">
+            <a:spAutoFit/>
+          </a:bodyPr>
+          <a:lstStyle/>
+          <a:p>
+            <a:pPr algn="ctr"/>
+            <a:r>
+              <a:rPr lang="en-US" dirty="0"/>
+              <a:t>Force an emergency landing</a:t>
+            </a:r>
+          </a:p>
+        </p:txBody>
+      </p:sp>
+      <p:pic>
+        <p:nvPicPr>
+          <p:cNvPr id="19" name="Picture 2" descr="gif of the tumblr anon face ...">
+            <a:extLst>
+              <a:ext uri="{FF2B5EF4-FFF2-40B4-BE49-F238E27FC236}">
+                <a16:creationId xmlns:a16="http://schemas.microsoft.com/office/drawing/2014/main" id="{E1D20A08-8039-203E-5562-A87612ED2325}"/>
+              </a:ext>
+            </a:extLst>
+          </p:cNvPr>
+          <p:cNvPicPr>
+            <a:picLocks noChangeAspect="1" noChangeArrowheads="1"/>
+          </p:cNvPicPr>
+          <p:nvPr/>
+        </p:nvPicPr>
+        <p:blipFill>
+          <a:blip r:embed="rId5">
+            <a:extLst>
+              <a:ext uri="{28A0092B-C50C-407E-A947-70E740481C1C}">
+                <a14:useLocalDpi xmlns:a14="http://schemas.microsoft.com/office/drawing/2010/main" val="0"/>
+              </a:ext>
+            </a:extLst>
+          </a:blip>
+          <a:srcRect/>
+          <a:stretch>
+            <a:fillRect/>
+          </a:stretch>
+        </p:blipFill>
+        <p:spPr bwMode="auto">
+          <a:xfrm>
+            <a:off x="7460987" y="4139735"/>
+            <a:ext cx="899556" cy="899556"/>
+          </a:xfrm>
+          <a:prstGeom prst="rect">
+            <a:avLst/>
+          </a:prstGeom>
+          <a:noFill/>
+          <a:extLst>
+            <a:ext uri="{909E8E84-426E-40DD-AFC4-6F175D3DCCD1}">
+              <a14:hiddenFill xmlns:a14="http://schemas.microsoft.com/office/drawing/2010/main">
+                <a:solidFill>
+                  <a:srgbClr val="FFFFFF"/>
+                </a:solidFill>
+              </a14:hiddenFill>
+            </a:ext>
+          </a:extLst>
+        </p:spPr>
+      </p:pic>
+      <p:pic>
+        <p:nvPicPr>
+          <p:cNvPr id="21" name="Picture 20">
+            <a:extLst>
+              <a:ext uri="{FF2B5EF4-FFF2-40B4-BE49-F238E27FC236}">
+                <a16:creationId xmlns:a16="http://schemas.microsoft.com/office/drawing/2014/main" id="{7456436D-116B-C343-F629-FD2A77A925B3}"/>
+              </a:ext>
+            </a:extLst>
+          </p:cNvPr>
+          <p:cNvPicPr>
+            <a:picLocks noChangeAspect="1"/>
+          </p:cNvPicPr>
+          <p:nvPr/>
+        </p:nvPicPr>
+        <p:blipFill>
+          <a:blip r:embed="rId6"/>
+          <a:stretch>
+            <a:fillRect/>
+          </a:stretch>
+        </p:blipFill>
+        <p:spPr>
+          <a:xfrm>
+            <a:off x="6202855" y="3283695"/>
+            <a:ext cx="1333686" cy="1324160"/>
+          </a:xfrm>
+          <a:prstGeom prst="rect">
+            <a:avLst/>
+          </a:prstGeom>
+        </p:spPr>
+      </p:pic>
+      <p:pic>
+        <p:nvPicPr>
+          <p:cNvPr id="23" name="Picture 22">
+            <a:extLst>
+              <a:ext uri="{FF2B5EF4-FFF2-40B4-BE49-F238E27FC236}">
+                <a16:creationId xmlns:a16="http://schemas.microsoft.com/office/drawing/2014/main" id="{5B6338F2-2066-CBAF-AF20-75B212A15942}"/>
+              </a:ext>
+            </a:extLst>
+          </p:cNvPr>
+          <p:cNvPicPr>
+            <a:picLocks noChangeAspect="1"/>
+          </p:cNvPicPr>
+          <p:nvPr/>
+        </p:nvPicPr>
+        <p:blipFill>
+          <a:blip r:embed="rId6"/>
+          <a:stretch>
+            <a:fillRect/>
+          </a:stretch>
+        </p:blipFill>
+        <p:spPr>
+          <a:xfrm>
+            <a:off x="8381437" y="3232199"/>
+            <a:ext cx="1333686" cy="1324160"/>
+          </a:xfrm>
+          <a:prstGeom prst="rect">
+            <a:avLst/>
+          </a:prstGeom>
+        </p:spPr>
+      </p:pic>
       <p:cxnSp>
         <p:nvCxnSpPr>
-          <p:cNvPr id="71" name="Connector: Elbow 70">
-            <a:extLst>
-              <a:ext uri="{FF2B5EF4-FFF2-40B4-BE49-F238E27FC236}">
-                <a16:creationId xmlns:a16="http://schemas.microsoft.com/office/drawing/2014/main" id="{20D036F8-4461-118A-BF5C-D816B68E7CF4}"/>
+          <p:cNvPr id="24" name="Straight Arrow Connector 23">
+            <a:extLst>
+              <a:ext uri="{FF2B5EF4-FFF2-40B4-BE49-F238E27FC236}">
+                <a16:creationId xmlns:a16="http://schemas.microsoft.com/office/drawing/2014/main" id="{990132A4-8CD5-2540-41A9-E4B0784AD014}"/>
               </a:ext>
             </a:extLst>
           </p:cNvPr>
           <p:cNvCxnSpPr>
             <a:cxnSpLocks/>
-            <a:stCxn id="64" idx="3"/>
-            <a:endCxn id="10" idx="1"/>
           </p:cNvCxnSpPr>
           <p:nvPr/>
         </p:nvCxnSpPr>
         <p:spPr>
-          <a:xfrm flipV="1">
-            <a:off x="5724693" y="3429000"/>
-            <a:ext cx="515562" cy="1162486"/>
-          </a:xfrm>
-          <a:prstGeom prst="bentConnector3">
-            <a:avLst>
-              <a:gd name="adj1" fmla="val 75557"/>
-            </a:avLst>
+          <a:xfrm>
+            <a:off x="7910765" y="2682542"/>
+            <a:ext cx="0" cy="624231"/>
+          </a:xfrm>
+          <a:prstGeom prst="straightConnector1">
+            <a:avLst/>
           </a:prstGeom>
-          <a:ln>
+          <a:ln w="57150">
+            <a:solidFill>
+              <a:srgbClr val="00B0F0"/>
+            </a:solidFill>
+            <a:prstDash val="sysDash"/>
             <a:tailEnd type="triangle"/>
           </a:ln>
         </p:spPr>
@@ -4881,10 +4433,10 @@
       </p:cxnSp>
       <p:sp>
         <p:nvSpPr>
-          <p:cNvPr id="75" name="TextBox 74">
-            <a:extLst>
-              <a:ext uri="{FF2B5EF4-FFF2-40B4-BE49-F238E27FC236}">
-                <a16:creationId xmlns:a16="http://schemas.microsoft.com/office/drawing/2014/main" id="{A66E5C1F-9DDF-D117-0B7F-5B5A656BA236}"/>
+          <p:cNvPr id="25" name="TextBox 24">
+            <a:extLst>
+              <a:ext uri="{FF2B5EF4-FFF2-40B4-BE49-F238E27FC236}">
+                <a16:creationId xmlns:a16="http://schemas.microsoft.com/office/drawing/2014/main" id="{04F065DA-6665-381B-301B-FE1309A50EE2}"/>
               </a:ext>
             </a:extLst>
           </p:cNvPr>
@@ -4893,8 +4445,8 @@
         </p:nvSpPr>
         <p:spPr>
           <a:xfrm>
-            <a:off x="4909589" y="3301789"/>
-            <a:ext cx="492443" cy="369332"/>
+            <a:off x="9253639" y="3429000"/>
+            <a:ext cx="2849764" cy="1200329"/>
           </a:xfrm>
           <a:prstGeom prst="rect">
             <a:avLst/>
@@ -4902,550 +4454,6 @@
           <a:noFill/>
         </p:spPr>
         <p:txBody>
-          <a:bodyPr wrap="none" rtlCol="0">
-            <a:spAutoFit/>
-          </a:bodyPr>
-          <a:lstStyle/>
-          <a:p>
-            <a:r>
-              <a:rPr lang="en-US" dirty="0"/>
-              <a:t>OR</a:t>
-            </a:r>
-          </a:p>
-        </p:txBody>
-      </p:sp>
-      <p:sp>
-        <p:nvSpPr>
-          <p:cNvPr id="76" name="Rectangle 75">
-            <a:extLst>
-              <a:ext uri="{FF2B5EF4-FFF2-40B4-BE49-F238E27FC236}">
-                <a16:creationId xmlns:a16="http://schemas.microsoft.com/office/drawing/2014/main" id="{4D2AEC9F-2F4E-F640-586B-EE41582E1A59}"/>
-              </a:ext>
-            </a:extLst>
-          </p:cNvPr>
-          <p:cNvSpPr/>
-          <p:nvPr/>
-        </p:nvSpPr>
-        <p:spPr>
-          <a:xfrm>
-            <a:off x="2228006" y="1630739"/>
-            <a:ext cx="927030" cy="891714"/>
-          </a:xfrm>
-          <a:prstGeom prst="rect">
-            <a:avLst/>
-          </a:prstGeom>
-        </p:spPr>
-        <p:style>
-          <a:lnRef idx="2">
-            <a:schemeClr val="accent1">
-              <a:shade val="15000"/>
-            </a:schemeClr>
-          </a:lnRef>
-          <a:fillRef idx="1">
-            <a:schemeClr val="accent1"/>
-          </a:fillRef>
-          <a:effectRef idx="0">
-            <a:schemeClr val="accent1"/>
-          </a:effectRef>
-          <a:fontRef idx="minor">
-            <a:schemeClr val="lt1"/>
-          </a:fontRef>
-        </p:style>
-        <p:txBody>
-          <a:bodyPr rtlCol="0" anchor="ctr"/>
-          <a:lstStyle/>
-          <a:p>
-            <a:pPr algn="ctr"/>
-            <a:r>
-              <a:rPr lang="en-US" dirty="0"/>
-              <a:t>User </a:t>
-            </a:r>
-            <a:r>
-              <a:rPr lang="en-US"/>
-              <a:t>(Pilot) Input</a:t>
-            </a:r>
-            <a:endParaRPr lang="en-US" dirty="0"/>
-          </a:p>
-        </p:txBody>
-      </p:sp>
-      <p:sp>
-        <p:nvSpPr>
-          <p:cNvPr id="77" name="Rectangle 76">
-            <a:extLst>
-              <a:ext uri="{FF2B5EF4-FFF2-40B4-BE49-F238E27FC236}">
-                <a16:creationId xmlns:a16="http://schemas.microsoft.com/office/drawing/2014/main" id="{B1072489-86A3-D0E4-C573-CC5960AC6A65}"/>
-              </a:ext>
-            </a:extLst>
-          </p:cNvPr>
-          <p:cNvSpPr/>
-          <p:nvPr/>
-        </p:nvSpPr>
-        <p:spPr>
-          <a:xfrm>
-            <a:off x="2228006" y="4335547"/>
-            <a:ext cx="927030" cy="891714"/>
-          </a:xfrm>
-          <a:prstGeom prst="rect">
-            <a:avLst/>
-          </a:prstGeom>
-        </p:spPr>
-        <p:style>
-          <a:lnRef idx="2">
-            <a:schemeClr val="accent1">
-              <a:shade val="15000"/>
-            </a:schemeClr>
-          </a:lnRef>
-          <a:fillRef idx="1">
-            <a:schemeClr val="accent1"/>
-          </a:fillRef>
-          <a:effectRef idx="0">
-            <a:schemeClr val="accent1"/>
-          </a:effectRef>
-          <a:fontRef idx="minor">
-            <a:schemeClr val="lt1"/>
-          </a:fontRef>
-        </p:style>
-        <p:txBody>
-          <a:bodyPr rtlCol="0" anchor="ctr"/>
-          <a:lstStyle/>
-          <a:p>
-            <a:pPr algn="ctr"/>
-            <a:r>
-              <a:rPr lang="en-US" sz="1400" dirty="0"/>
-              <a:t>RX Voltage from Words</a:t>
-            </a:r>
-          </a:p>
-        </p:txBody>
-      </p:sp>
-      <p:sp>
-        <p:nvSpPr>
-          <p:cNvPr id="79" name="Rectangle: Rounded Corners 78">
-            <a:extLst>
-              <a:ext uri="{FF2B5EF4-FFF2-40B4-BE49-F238E27FC236}">
-                <a16:creationId xmlns:a16="http://schemas.microsoft.com/office/drawing/2014/main" id="{650A4D6F-44D7-F7F1-8007-E234C65483F2}"/>
-              </a:ext>
-            </a:extLst>
-          </p:cNvPr>
-          <p:cNvSpPr/>
-          <p:nvPr/>
-        </p:nvSpPr>
-        <p:spPr>
-          <a:xfrm>
-            <a:off x="2122639" y="6206344"/>
-            <a:ext cx="1137765" cy="474650"/>
-          </a:xfrm>
-          <a:prstGeom prst="roundRect">
-            <a:avLst/>
-          </a:prstGeom>
-        </p:spPr>
-        <p:style>
-          <a:lnRef idx="2">
-            <a:schemeClr val="accent1">
-              <a:shade val="15000"/>
-            </a:schemeClr>
-          </a:lnRef>
-          <a:fillRef idx="1">
-            <a:schemeClr val="accent1"/>
-          </a:fillRef>
-          <a:effectRef idx="0">
-            <a:schemeClr val="accent1"/>
-          </a:effectRef>
-          <a:fontRef idx="minor">
-            <a:schemeClr val="lt1"/>
-          </a:fontRef>
-        </p:style>
-        <p:txBody>
-          <a:bodyPr rtlCol="0" anchor="ctr"/>
-          <a:lstStyle/>
-          <a:p>
-            <a:pPr algn="ctr"/>
-            <a:r>
-              <a:rPr lang="en-US" sz="1100" dirty="0"/>
-              <a:t>ADIRU</a:t>
-            </a:r>
-          </a:p>
-        </p:txBody>
-      </p:sp>
-      <p:cxnSp>
-        <p:nvCxnSpPr>
-          <p:cNvPr id="81" name="Straight Arrow Connector 80">
-            <a:extLst>
-              <a:ext uri="{FF2B5EF4-FFF2-40B4-BE49-F238E27FC236}">
-                <a16:creationId xmlns:a16="http://schemas.microsoft.com/office/drawing/2014/main" id="{50066EE9-2CA8-04E5-CE9C-D60CBCD5FA1E}"/>
-              </a:ext>
-            </a:extLst>
-          </p:cNvPr>
-          <p:cNvCxnSpPr>
-            <a:cxnSpLocks/>
-            <a:stCxn id="79" idx="0"/>
-            <a:endCxn id="77" idx="2"/>
-          </p:cNvCxnSpPr>
-          <p:nvPr/>
-        </p:nvCxnSpPr>
-        <p:spPr>
-          <a:xfrm flipH="1" flipV="1">
-            <a:off x="2691521" y="5227261"/>
-            <a:ext cx="1" cy="979083"/>
-          </a:xfrm>
-          <a:prstGeom prst="straightConnector1">
-            <a:avLst/>
-          </a:prstGeom>
-          <a:ln w="57150">
-            <a:solidFill>
-              <a:srgbClr val="00B0F0"/>
-            </a:solidFill>
-            <a:prstDash val="sysDash"/>
-            <a:tailEnd type="triangle"/>
-          </a:ln>
-        </p:spPr>
-        <p:style>
-          <a:lnRef idx="2">
-            <a:schemeClr val="accent1"/>
-          </a:lnRef>
-          <a:fillRef idx="0">
-            <a:schemeClr val="accent1"/>
-          </a:fillRef>
-          <a:effectRef idx="1">
-            <a:schemeClr val="accent1"/>
-          </a:effectRef>
-          <a:fontRef idx="minor">
-            <a:schemeClr val="tx1"/>
-          </a:fontRef>
-        </p:style>
-      </p:cxnSp>
-      <p:cxnSp>
-        <p:nvCxnSpPr>
-          <p:cNvPr id="87" name="Connector: Elbow 86">
-            <a:extLst>
-              <a:ext uri="{FF2B5EF4-FFF2-40B4-BE49-F238E27FC236}">
-                <a16:creationId xmlns:a16="http://schemas.microsoft.com/office/drawing/2014/main" id="{489876EB-E126-75F9-CA6D-5A2403F0A549}"/>
-              </a:ext>
-            </a:extLst>
-          </p:cNvPr>
-          <p:cNvCxnSpPr>
-            <a:cxnSpLocks/>
-            <a:stCxn id="76" idx="2"/>
-            <a:endCxn id="47" idx="1"/>
-          </p:cNvCxnSpPr>
-          <p:nvPr/>
-        </p:nvCxnSpPr>
-        <p:spPr>
-          <a:xfrm rot="16200000" flipH="1">
-            <a:off x="2301334" y="2912639"/>
-            <a:ext cx="917454" cy="137081"/>
-          </a:xfrm>
-          <a:prstGeom prst="bentConnector2">
-            <a:avLst/>
-          </a:prstGeom>
-          <a:ln>
-            <a:tailEnd type="triangle"/>
-          </a:ln>
-        </p:spPr>
-        <p:style>
-          <a:lnRef idx="2">
-            <a:schemeClr val="accent1"/>
-          </a:lnRef>
-          <a:fillRef idx="0">
-            <a:schemeClr val="accent1"/>
-          </a:fillRef>
-          <a:effectRef idx="1">
-            <a:schemeClr val="accent1"/>
-          </a:effectRef>
-          <a:fontRef idx="minor">
-            <a:schemeClr val="tx1"/>
-          </a:fontRef>
-        </p:style>
-      </p:cxnSp>
-      <p:cxnSp>
-        <p:nvCxnSpPr>
-          <p:cNvPr id="89" name="Connector: Elbow 88">
-            <a:extLst>
-              <a:ext uri="{FF2B5EF4-FFF2-40B4-BE49-F238E27FC236}">
-                <a16:creationId xmlns:a16="http://schemas.microsoft.com/office/drawing/2014/main" id="{C1CF28BA-3AC7-078D-07F8-4FF33FFC4767}"/>
-              </a:ext>
-            </a:extLst>
-          </p:cNvPr>
-          <p:cNvCxnSpPr>
-            <a:cxnSpLocks/>
-            <a:stCxn id="77" idx="0"/>
-            <a:endCxn id="47" idx="1"/>
-          </p:cNvCxnSpPr>
-          <p:nvPr/>
-        </p:nvCxnSpPr>
-        <p:spPr>
-          <a:xfrm rot="5400000" flipH="1" flipV="1">
-            <a:off x="2312241" y="3819187"/>
-            <a:ext cx="895640" cy="137081"/>
-          </a:xfrm>
-          <a:prstGeom prst="bentConnector2">
-            <a:avLst/>
-          </a:prstGeom>
-          <a:ln>
-            <a:tailEnd type="triangle"/>
-          </a:ln>
-        </p:spPr>
-        <p:style>
-          <a:lnRef idx="2">
-            <a:schemeClr val="accent1"/>
-          </a:lnRef>
-          <a:fillRef idx="0">
-            <a:schemeClr val="accent1"/>
-          </a:fillRef>
-          <a:effectRef idx="1">
-            <a:schemeClr val="accent1"/>
-          </a:effectRef>
-          <a:fontRef idx="minor">
-            <a:schemeClr val="tx1"/>
-          </a:fontRef>
-        </p:style>
-      </p:cxnSp>
-      <p:sp>
-        <p:nvSpPr>
-          <p:cNvPr id="93" name="Rectangle 92">
-            <a:extLst>
-              <a:ext uri="{FF2B5EF4-FFF2-40B4-BE49-F238E27FC236}">
-                <a16:creationId xmlns:a16="http://schemas.microsoft.com/office/drawing/2014/main" id="{10314E0B-0F71-7816-1E8D-582F3BF1428F}"/>
-              </a:ext>
-            </a:extLst>
-          </p:cNvPr>
-          <p:cNvSpPr/>
-          <p:nvPr/>
-        </p:nvSpPr>
-        <p:spPr>
-          <a:xfrm>
-            <a:off x="755763" y="2834713"/>
-            <a:ext cx="1273309" cy="1188574"/>
-          </a:xfrm>
-          <a:prstGeom prst="rect">
-            <a:avLst/>
-          </a:prstGeom>
-        </p:spPr>
-        <p:style>
-          <a:lnRef idx="2">
-            <a:schemeClr val="accent1">
-              <a:shade val="15000"/>
-            </a:schemeClr>
-          </a:lnRef>
-          <a:fillRef idx="1">
-            <a:schemeClr val="accent1"/>
-          </a:fillRef>
-          <a:effectRef idx="0">
-            <a:schemeClr val="accent1"/>
-          </a:effectRef>
-          <a:fontRef idx="minor">
-            <a:schemeClr val="lt1"/>
-          </a:fontRef>
-        </p:style>
-        <p:txBody>
-          <a:bodyPr rtlCol="0" anchor="ctr"/>
-          <a:lstStyle/>
-          <a:p>
-            <a:pPr algn="ctr"/>
-            <a:r>
-              <a:rPr lang="en-US" sz="1400" dirty="0"/>
-              <a:t>Maintenance Program (vuln w/ root system </a:t>
-            </a:r>
-            <a:r>
-              <a:rPr lang="en-US" sz="1400" dirty="0" err="1"/>
-              <a:t>priv</a:t>
-            </a:r>
-            <a:r>
-              <a:rPr lang="en-US" sz="1400" dirty="0"/>
-              <a:t>)</a:t>
-            </a:r>
-          </a:p>
-        </p:txBody>
-      </p:sp>
-      <p:cxnSp>
-        <p:nvCxnSpPr>
-          <p:cNvPr id="99" name="Connector: Elbow 98">
-            <a:extLst>
-              <a:ext uri="{FF2B5EF4-FFF2-40B4-BE49-F238E27FC236}">
-                <a16:creationId xmlns:a16="http://schemas.microsoft.com/office/drawing/2014/main" id="{DF683187-78A1-9A66-2182-EB59956A716D}"/>
-              </a:ext>
-            </a:extLst>
-          </p:cNvPr>
-          <p:cNvCxnSpPr>
-            <a:stCxn id="93" idx="0"/>
-            <a:endCxn id="47" idx="0"/>
-          </p:cNvCxnSpPr>
-          <p:nvPr/>
-        </p:nvCxnSpPr>
-        <p:spPr>
-          <a:xfrm rot="5400000" flipH="1" flipV="1">
-            <a:off x="2413107" y="1774426"/>
-            <a:ext cx="39598" cy="2080976"/>
-          </a:xfrm>
-          <a:prstGeom prst="bentConnector3">
-            <a:avLst>
-              <a:gd name="adj1" fmla="val 3714799"/>
-            </a:avLst>
-          </a:prstGeom>
-          <a:ln>
-            <a:tailEnd type="triangle"/>
-          </a:ln>
-        </p:spPr>
-        <p:style>
-          <a:lnRef idx="2">
-            <a:schemeClr val="accent1"/>
-          </a:lnRef>
-          <a:fillRef idx="0">
-            <a:schemeClr val="accent1"/>
-          </a:fillRef>
-          <a:effectRef idx="1">
-            <a:schemeClr val="accent1"/>
-          </a:effectRef>
-          <a:fontRef idx="minor">
-            <a:schemeClr val="tx1"/>
-          </a:fontRef>
-        </p:style>
-      </p:cxnSp>
-      <p:sp>
-        <p:nvSpPr>
-          <p:cNvPr id="102" name="TextBox 101">
-            <a:extLst>
-              <a:ext uri="{FF2B5EF4-FFF2-40B4-BE49-F238E27FC236}">
-                <a16:creationId xmlns:a16="http://schemas.microsoft.com/office/drawing/2014/main" id="{37A96E0B-32F3-029B-B2B7-32EE15CE54AA}"/>
-              </a:ext>
-            </a:extLst>
-          </p:cNvPr>
-          <p:cNvSpPr txBox="1"/>
-          <p:nvPr/>
-        </p:nvSpPr>
-        <p:spPr>
-          <a:xfrm>
-            <a:off x="6413010" y="812274"/>
-            <a:ext cx="596638" cy="369332"/>
-          </a:xfrm>
-          <a:prstGeom prst="rect">
-            <a:avLst/>
-          </a:prstGeom>
-          <a:noFill/>
-        </p:spPr>
-        <p:txBody>
-          <a:bodyPr wrap="none" rtlCol="0">
-            <a:spAutoFit/>
-          </a:bodyPr>
-          <a:lstStyle/>
-          <a:p>
-            <a:r>
-              <a:rPr lang="en-US" dirty="0"/>
-              <a:t>LRU</a:t>
-            </a:r>
-          </a:p>
-        </p:txBody>
-      </p:sp>
-      <p:cxnSp>
-        <p:nvCxnSpPr>
-          <p:cNvPr id="104" name="Straight Arrow Connector 103">
-            <a:extLst>
-              <a:ext uri="{FF2B5EF4-FFF2-40B4-BE49-F238E27FC236}">
-                <a16:creationId xmlns:a16="http://schemas.microsoft.com/office/drawing/2014/main" id="{089175C9-062B-F295-E565-D5EAAF04F368}"/>
-              </a:ext>
-            </a:extLst>
-          </p:cNvPr>
-          <p:cNvCxnSpPr>
-            <a:cxnSpLocks/>
-          </p:cNvCxnSpPr>
-          <p:nvPr/>
-        </p:nvCxnSpPr>
-        <p:spPr>
-          <a:xfrm>
-            <a:off x="105111" y="2977660"/>
-            <a:ext cx="664440" cy="1"/>
-          </a:xfrm>
-          <a:prstGeom prst="straightConnector1">
-            <a:avLst/>
-          </a:prstGeom>
-          <a:ln>
-            <a:solidFill>
-              <a:srgbClr val="FF0000"/>
-            </a:solidFill>
-            <a:headEnd type="arrow" w="med" len="med"/>
-            <a:tailEnd type="arrow" w="med" len="med"/>
-          </a:ln>
-        </p:spPr>
-        <p:style>
-          <a:lnRef idx="2">
-            <a:schemeClr val="accent1"/>
-          </a:lnRef>
-          <a:fillRef idx="0">
-            <a:schemeClr val="accent1"/>
-          </a:fillRef>
-          <a:effectRef idx="1">
-            <a:schemeClr val="accent1"/>
-          </a:effectRef>
-          <a:fontRef idx="minor">
-            <a:schemeClr val="tx1"/>
-          </a:fontRef>
-        </p:style>
-      </p:cxnSp>
-      <p:sp>
-        <p:nvSpPr>
-          <p:cNvPr id="105" name="TextBox 104">
-            <a:extLst>
-              <a:ext uri="{FF2B5EF4-FFF2-40B4-BE49-F238E27FC236}">
-                <a16:creationId xmlns:a16="http://schemas.microsoft.com/office/drawing/2014/main" id="{5D62D669-9206-80CF-7A5B-D3BD7C3B3EDB}"/>
-              </a:ext>
-            </a:extLst>
-          </p:cNvPr>
-          <p:cNvSpPr txBox="1"/>
-          <p:nvPr/>
-        </p:nvSpPr>
-        <p:spPr>
-          <a:xfrm>
-            <a:off x="37254" y="3009086"/>
-            <a:ext cx="774571" cy="430887"/>
-          </a:xfrm>
-          <a:prstGeom prst="rect">
-            <a:avLst/>
-          </a:prstGeom>
-          <a:noFill/>
-        </p:spPr>
-        <p:txBody>
-          <a:bodyPr wrap="none" rtlCol="0">
-            <a:spAutoFit/>
-          </a:bodyPr>
-          <a:lstStyle/>
-          <a:p>
-            <a:pPr algn="ctr"/>
-            <a:r>
-              <a:rPr lang="en-US" sz="1100" dirty="0"/>
-              <a:t>IP Access</a:t>
-            </a:r>
-          </a:p>
-          <a:p>
-            <a:pPr algn="ctr"/>
-            <a:r>
-              <a:rPr lang="en-US" sz="1100" dirty="0"/>
-              <a:t>/Eth</a:t>
-            </a:r>
-          </a:p>
-        </p:txBody>
-      </p:sp>
-      <p:sp>
-        <p:nvSpPr>
-          <p:cNvPr id="106" name="TextBox 105">
-            <a:extLst>
-              <a:ext uri="{FF2B5EF4-FFF2-40B4-BE49-F238E27FC236}">
-                <a16:creationId xmlns:a16="http://schemas.microsoft.com/office/drawing/2014/main" id="{3790D2B2-A4E3-F09F-9E44-5DF24FEC21D8}"/>
-              </a:ext>
-            </a:extLst>
-          </p:cNvPr>
-          <p:cNvSpPr txBox="1"/>
-          <p:nvPr/>
-        </p:nvSpPr>
-        <p:spPr>
-          <a:xfrm>
-            <a:off x="1635913" y="894778"/>
-            <a:ext cx="1579454" cy="461665"/>
-          </a:xfrm>
-          <a:prstGeom prst="rect">
-            <a:avLst/>
-          </a:prstGeom>
-          <a:noFill/>
-        </p:spPr>
-        <p:txBody>
           <a:bodyPr wrap="square" rtlCol="0">
             <a:spAutoFit/>
           </a:bodyPr>
@@ -5453,138 +4461,8 @@
           <a:p>
             <a:pPr algn="ctr"/>
             <a:r>
-              <a:rPr lang="en-US" sz="1200" dirty="0"/>
-              <a:t>Irregular, custom word generation</a:t>
-            </a:r>
-          </a:p>
-        </p:txBody>
-      </p:sp>
-      <p:cxnSp>
-        <p:nvCxnSpPr>
-          <p:cNvPr id="108" name="Straight Arrow Connector 107">
-            <a:extLst>
-              <a:ext uri="{FF2B5EF4-FFF2-40B4-BE49-F238E27FC236}">
-                <a16:creationId xmlns:a16="http://schemas.microsoft.com/office/drawing/2014/main" id="{98C1A8CC-502B-2C6B-AB04-9E6975320ACC}"/>
-              </a:ext>
-            </a:extLst>
-          </p:cNvPr>
-          <p:cNvCxnSpPr>
-            <a:stCxn id="76" idx="1"/>
-          </p:cNvCxnSpPr>
-          <p:nvPr/>
-        </p:nvCxnSpPr>
-        <p:spPr>
-          <a:xfrm flipH="1">
-            <a:off x="154745" y="2076596"/>
-            <a:ext cx="2073261" cy="0"/>
-          </a:xfrm>
-          <a:prstGeom prst="straightConnector1">
-            <a:avLst/>
-          </a:prstGeom>
-          <a:ln>
-            <a:solidFill>
-              <a:srgbClr val="FF0000"/>
-            </a:solidFill>
-            <a:headEnd type="arrow" w="med" len="med"/>
-            <a:tailEnd type="none" w="med" len="med"/>
-          </a:ln>
-        </p:spPr>
-        <p:style>
-          <a:lnRef idx="2">
-            <a:schemeClr val="accent1"/>
-          </a:lnRef>
-          <a:fillRef idx="0">
-            <a:schemeClr val="accent1"/>
-          </a:fillRef>
-          <a:effectRef idx="1">
-            <a:schemeClr val="accent1"/>
-          </a:effectRef>
-          <a:fontRef idx="minor">
-            <a:schemeClr val="tx1"/>
-          </a:fontRef>
-        </p:style>
-      </p:cxnSp>
-      <p:sp>
-        <p:nvSpPr>
-          <p:cNvPr id="109" name="TextBox 108">
-            <a:extLst>
-              <a:ext uri="{FF2B5EF4-FFF2-40B4-BE49-F238E27FC236}">
-                <a16:creationId xmlns:a16="http://schemas.microsoft.com/office/drawing/2014/main" id="{AD9BED6C-300A-AF7C-1609-BAF5F48BD190}"/>
-              </a:ext>
-            </a:extLst>
-          </p:cNvPr>
-          <p:cNvSpPr txBox="1"/>
-          <p:nvPr/>
-        </p:nvSpPr>
-        <p:spPr>
-          <a:xfrm>
-            <a:off x="58356" y="1778495"/>
-            <a:ext cx="1288751" cy="276999"/>
-          </a:xfrm>
-          <a:prstGeom prst="rect">
-            <a:avLst/>
-          </a:prstGeom>
-          <a:noFill/>
-        </p:spPr>
-        <p:txBody>
-          <a:bodyPr wrap="none" rtlCol="0">
-            <a:spAutoFit/>
-          </a:bodyPr>
-          <a:lstStyle/>
-          <a:p>
-            <a:r>
-              <a:rPr lang="en-US" sz="1200" dirty="0"/>
-              <a:t>Fly-by-wire input</a:t>
-            </a:r>
-          </a:p>
-        </p:txBody>
-      </p:sp>
-      <p:sp>
-        <p:nvSpPr>
-          <p:cNvPr id="17" name="TextBox 16">
-            <a:extLst>
-              <a:ext uri="{FF2B5EF4-FFF2-40B4-BE49-F238E27FC236}">
-                <a16:creationId xmlns:a16="http://schemas.microsoft.com/office/drawing/2014/main" id="{9E08F0DC-25B4-5930-1B2A-93CF3DB5E7AA}"/>
-              </a:ext>
-            </a:extLst>
-          </p:cNvPr>
-          <p:cNvSpPr txBox="1"/>
-          <p:nvPr/>
-        </p:nvSpPr>
-        <p:spPr>
-          <a:xfrm>
-            <a:off x="2092134" y="3119225"/>
-            <a:ext cx="835485" cy="577081"/>
-          </a:xfrm>
-          <a:prstGeom prst="rect">
-            <a:avLst/>
-          </a:prstGeom>
-          <a:noFill/>
-        </p:spPr>
-        <p:txBody>
-          <a:bodyPr wrap="none" rtlCol="0">
-            <a:spAutoFit/>
-          </a:bodyPr>
-          <a:lstStyle/>
-          <a:p>
-            <a:pPr algn="ctr"/>
-            <a:r>
-              <a:rPr lang="en-US" sz="1050" dirty="0"/>
-              <a:t>Regular </a:t>
-            </a:r>
-          </a:p>
-          <a:p>
-            <a:pPr algn="ctr"/>
-            <a:r>
-              <a:rPr lang="en-US" sz="1050" dirty="0"/>
-              <a:t>Word </a:t>
-            </a:r>
-          </a:p>
-          <a:p>
-            <a:pPr algn="ctr"/>
-            <a:r>
-              <a:rPr lang="en-US" sz="1050" dirty="0"/>
-              <a:t>Generation</a:t>
+              <a:rPr lang="en-US" dirty="0"/>
+              <a:t>Agents waiting at airport apprehend Person of Interest for being critical of their government</a:t>
             </a:r>
           </a:p>
         </p:txBody>
@@ -5592,7 +4470,7 @@
     </p:spTree>
     <p:extLst>
       <p:ext uri="{BB962C8B-B14F-4D97-AF65-F5344CB8AC3E}">
-        <p14:creationId xmlns:p14="http://schemas.microsoft.com/office/powerpoint/2010/main" val="2038829141"/>
+        <p14:creationId xmlns:p14="http://schemas.microsoft.com/office/powerpoint/2010/main" val="3310268067"/>
       </p:ext>
     </p:extLst>
   </p:cSld>

</xml_diff>